<commit_message>
Update Data Mining 00 - Study Contract - odd Sem 2024.pptx
</commit_message>
<xml_diff>
--- a/Data Mining 00 - Study Contract - odd Sem 2024.pptx
+++ b/Data Mining 00 - Study Contract - odd Sem 2024.pptx
@@ -275,7 +275,7 @@
       </p15:sldGuideLst>
     </p:ext>
     <p:ext uri="http://customooxmlschemas.google.com/">
-      <go:slidesCustomData xmlns:go="http://customooxmlschemas.google.com/" xmlns:ahyp="http://schemas.microsoft.com/office/drawing/2018/hyperlinkcolor" xmlns:p15="http://schemas.microsoft.com/office/powerpoint/2012/main" xmlns:p14="http://schemas.microsoft.com/office/powerpoint/2010/main" xmlns:com="http://schemas.openxmlformats.org/drawingml/2006/compatibility" xmlns:pvml="urn:schemas-microsoft-com:office:powerpoint" xmlns:v="urn:schemas-microsoft-com:vml" xmlns:o="urn:schemas-microsoft-com:office:office" xmlns:dgm="http://schemas.openxmlformats.org/drawingml/2006/diagram" xmlns:c="http://schemas.openxmlformats.org/drawingml/2006/chart" xmlns:mv="urn:schemas-microsoft-com:mac:vml" xmlns:mc="http://schemas.openxmlformats.org/markup-compatibility/2006" xmlns="" r:id="rId38" roundtripDataSignature="AMtx7mg1xIdlU9iqJWCF4sosEKO5NfSY+w=="/>
+      <go:slidesCustomData xmlns="" xmlns:mc="http://schemas.openxmlformats.org/markup-compatibility/2006" xmlns:mv="urn:schemas-microsoft-com:mac:vml" xmlns:c="http://schemas.openxmlformats.org/drawingml/2006/chart" xmlns:dgm="http://schemas.openxmlformats.org/drawingml/2006/diagram" xmlns:o="urn:schemas-microsoft-com:office:office" xmlns:v="urn:schemas-microsoft-com:vml" xmlns:pvml="urn:schemas-microsoft-com:office:powerpoint" xmlns:com="http://schemas.openxmlformats.org/drawingml/2006/compatibility" xmlns:p14="http://schemas.microsoft.com/office/powerpoint/2010/main" xmlns:p15="http://schemas.microsoft.com/office/powerpoint/2012/main" xmlns:ahyp="http://schemas.microsoft.com/office/drawing/2018/hyperlinkcolor" xmlns:go="http://customooxmlschemas.google.com/" r:id="rId38" roundtripDataSignature="AMtx7mg1xIdlU9iqJWCF4sosEKO5NfSY+w=="/>
     </p:ext>
   </p:extLst>
 </p:presentation>
@@ -294,7 +294,7 @@
   <pc:docChgLst>
     <pc:chgData name="Taufik Edy Sutanto, M.Sc.Tech.,Ph.D" userId="012573cc-7230-4d80-9d32-62cda141001e" providerId="ADAL" clId="{B26CF93A-456C-464D-864A-510C2BBAE113}"/>
     <pc:docChg chg="undo custSel delSld modSld modMainMaster">
-      <pc:chgData name="Taufik Edy Sutanto, M.Sc.Tech.,Ph.D" userId="012573cc-7230-4d80-9d32-62cda141001e" providerId="ADAL" clId="{B26CF93A-456C-464D-864A-510C2BBAE113}" dt="2024-09-05T03:30:29.371" v="1859" actId="20577"/>
+      <pc:chgData name="Taufik Edy Sutanto, M.Sc.Tech.,Ph.D" userId="012573cc-7230-4d80-9d32-62cda141001e" providerId="ADAL" clId="{B26CF93A-456C-464D-864A-510C2BBAE113}" dt="2024-09-11T04:22:33.417" v="1899" actId="478"/>
       <pc:docMkLst>
         <pc:docMk/>
       </pc:docMkLst>
@@ -572,7 +572,7 @@
         </pc:picChg>
       </pc:sldChg>
       <pc:sldChg chg="delSp modSp mod setBg">
-        <pc:chgData name="Taufik Edy Sutanto, M.Sc.Tech.,Ph.D" userId="012573cc-7230-4d80-9d32-62cda141001e" providerId="ADAL" clId="{B26CF93A-456C-464D-864A-510C2BBAE113}" dt="2024-09-05T03:30:29.371" v="1859" actId="20577"/>
+        <pc:chgData name="Taufik Edy Sutanto, M.Sc.Tech.,Ph.D" userId="012573cc-7230-4d80-9d32-62cda141001e" providerId="ADAL" clId="{B26CF93A-456C-464D-864A-510C2BBAE113}" dt="2024-09-11T04:21:46.986" v="1867" actId="20577"/>
         <pc:sldMkLst>
           <pc:docMk/>
           <pc:sldMk cId="0" sldId="265"/>
@@ -594,7 +594,7 @@
           </ac:spMkLst>
         </pc:spChg>
         <pc:graphicFrameChg chg="mod modGraphic">
-          <ac:chgData name="Taufik Edy Sutanto, M.Sc.Tech.,Ph.D" userId="012573cc-7230-4d80-9d32-62cda141001e" providerId="ADAL" clId="{B26CF93A-456C-464D-864A-510C2BBAE113}" dt="2024-09-05T03:30:29.371" v="1859" actId="20577"/>
+          <ac:chgData name="Taufik Edy Sutanto, M.Sc.Tech.,Ph.D" userId="012573cc-7230-4d80-9d32-62cda141001e" providerId="ADAL" clId="{B26CF93A-456C-464D-864A-510C2BBAE113}" dt="2024-09-11T04:21:46.986" v="1867" actId="20577"/>
           <ac:graphicFrameMkLst>
             <pc:docMk/>
             <pc:sldMk cId="0" sldId="265"/>
@@ -611,7 +611,7 @@
         </pc:picChg>
       </pc:sldChg>
       <pc:sldChg chg="delSp modSp mod setBg">
-        <pc:chgData name="Taufik Edy Sutanto, M.Sc.Tech.,Ph.D" userId="012573cc-7230-4d80-9d32-62cda141001e" providerId="ADAL" clId="{B26CF93A-456C-464D-864A-510C2BBAE113}" dt="2024-09-05T01:10:10.969" v="1070" actId="113"/>
+        <pc:chgData name="Taufik Edy Sutanto, M.Sc.Tech.,Ph.D" userId="012573cc-7230-4d80-9d32-62cda141001e" providerId="ADAL" clId="{B26CF93A-456C-464D-864A-510C2BBAE113}" dt="2024-09-11T04:22:33.417" v="1899" actId="478"/>
         <pc:sldMkLst>
           <pc:docMk/>
           <pc:sldMk cId="0" sldId="266"/>
@@ -632,8 +632,16 @@
             <ac:spMk id="284" creationId="{00000000-0000-0000-0000-000000000000}"/>
           </ac:spMkLst>
         </pc:spChg>
+        <pc:spChg chg="del">
+          <ac:chgData name="Taufik Edy Sutanto, M.Sc.Tech.,Ph.D" userId="012573cc-7230-4d80-9d32-62cda141001e" providerId="ADAL" clId="{B26CF93A-456C-464D-864A-510C2BBAE113}" dt="2024-09-11T04:22:33.417" v="1899" actId="478"/>
+          <ac:spMkLst>
+            <pc:docMk/>
+            <pc:sldMk cId="0" sldId="266"/>
+            <ac:spMk id="286" creationId="{00000000-0000-0000-0000-000000000000}"/>
+          </ac:spMkLst>
+        </pc:spChg>
         <pc:graphicFrameChg chg="modGraphic">
-          <ac:chgData name="Taufik Edy Sutanto, M.Sc.Tech.,Ph.D" userId="012573cc-7230-4d80-9d32-62cda141001e" providerId="ADAL" clId="{B26CF93A-456C-464D-864A-510C2BBAE113}" dt="2024-09-05T01:10:10.969" v="1070" actId="113"/>
+          <ac:chgData name="Taufik Edy Sutanto, M.Sc.Tech.,Ph.D" userId="012573cc-7230-4d80-9d32-62cda141001e" providerId="ADAL" clId="{B26CF93A-456C-464D-864A-510C2BBAE113}" dt="2024-09-11T04:22:25.991" v="1898" actId="20577"/>
           <ac:graphicFrameMkLst>
             <pc:docMk/>
             <pc:sldMk cId="0" sldId="266"/>
@@ -7468,7 +7476,7 @@
         <p:fade/>
       </p:transition>
     </mc:Choice>
-    <mc:Fallback xmlns:ahyp="http://schemas.microsoft.com/office/drawing/2018/hyperlinkcolor" xmlns:p15="http://schemas.microsoft.com/office/powerpoint/2012/main" xmlns:com="http://schemas.openxmlformats.org/drawingml/2006/compatibility" xmlns:pvml="urn:schemas-microsoft-com:office:powerpoint" xmlns:v="urn:schemas-microsoft-com:vml" xmlns:o="urn:schemas-microsoft-com:office:office" xmlns:dgm="http://schemas.openxmlformats.org/drawingml/2006/diagram" xmlns:c="http://schemas.openxmlformats.org/drawingml/2006/chart" xmlns:mv="urn:schemas-microsoft-com:mac:vml" xmlns="">
+    <mc:Fallback xmlns="" xmlns:mv="urn:schemas-microsoft-com:mac:vml" xmlns:c="http://schemas.openxmlformats.org/drawingml/2006/chart" xmlns:dgm="http://schemas.openxmlformats.org/drawingml/2006/diagram" xmlns:o="urn:schemas-microsoft-com:office:office" xmlns:v="urn:schemas-microsoft-com:vml" xmlns:pvml="urn:schemas-microsoft-com:office:powerpoint" xmlns:com="http://schemas.openxmlformats.org/drawingml/2006/compatibility" xmlns:p15="http://schemas.microsoft.com/office/powerpoint/2012/main" xmlns:ahyp="http://schemas.microsoft.com/office/drawing/2018/hyperlinkcolor">
       <p:transition spd="slow">
         <p:fade/>
       </p:transition>
@@ -8457,7 +8465,7 @@
         <p:fade/>
       </p:transition>
     </mc:Choice>
-    <mc:Fallback xmlns:ahyp="http://schemas.microsoft.com/office/drawing/2018/hyperlinkcolor" xmlns:p15="http://schemas.microsoft.com/office/powerpoint/2012/main" xmlns:com="http://schemas.openxmlformats.org/drawingml/2006/compatibility" xmlns:pvml="urn:schemas-microsoft-com:office:powerpoint" xmlns:v="urn:schemas-microsoft-com:vml" xmlns:o="urn:schemas-microsoft-com:office:office" xmlns:dgm="http://schemas.openxmlformats.org/drawingml/2006/diagram" xmlns:c="http://schemas.openxmlformats.org/drawingml/2006/chart" xmlns:mv="urn:schemas-microsoft-com:mac:vml" xmlns="">
+    <mc:Fallback xmlns="" xmlns:mv="urn:schemas-microsoft-com:mac:vml" xmlns:c="http://schemas.openxmlformats.org/drawingml/2006/chart" xmlns:dgm="http://schemas.openxmlformats.org/drawingml/2006/diagram" xmlns:o="urn:schemas-microsoft-com:office:office" xmlns:v="urn:schemas-microsoft-com:vml" xmlns:pvml="urn:schemas-microsoft-com:office:powerpoint" xmlns:com="http://schemas.openxmlformats.org/drawingml/2006/compatibility" xmlns:p15="http://schemas.microsoft.com/office/powerpoint/2012/main" xmlns:ahyp="http://schemas.microsoft.com/office/drawing/2018/hyperlinkcolor">
       <p:transition spd="slow">
         <p:fade/>
       </p:transition>
@@ -9445,7 +9453,7 @@
         <p:fade/>
       </p:transition>
     </mc:Choice>
-    <mc:Fallback xmlns:ahyp="http://schemas.microsoft.com/office/drawing/2018/hyperlinkcolor" xmlns:p15="http://schemas.microsoft.com/office/powerpoint/2012/main" xmlns:com="http://schemas.openxmlformats.org/drawingml/2006/compatibility" xmlns:pvml="urn:schemas-microsoft-com:office:powerpoint" xmlns:v="urn:schemas-microsoft-com:vml" xmlns:o="urn:schemas-microsoft-com:office:office" xmlns:dgm="http://schemas.openxmlformats.org/drawingml/2006/diagram" xmlns:c="http://schemas.openxmlformats.org/drawingml/2006/chart" xmlns:mv="urn:schemas-microsoft-com:mac:vml" xmlns="">
+    <mc:Fallback xmlns="" xmlns:mv="urn:schemas-microsoft-com:mac:vml" xmlns:c="http://schemas.openxmlformats.org/drawingml/2006/chart" xmlns:dgm="http://schemas.openxmlformats.org/drawingml/2006/diagram" xmlns:o="urn:schemas-microsoft-com:office:office" xmlns:v="urn:schemas-microsoft-com:vml" xmlns:pvml="urn:schemas-microsoft-com:office:powerpoint" xmlns:com="http://schemas.openxmlformats.org/drawingml/2006/compatibility" xmlns:p15="http://schemas.microsoft.com/office/powerpoint/2012/main" xmlns:ahyp="http://schemas.microsoft.com/office/drawing/2018/hyperlinkcolor">
       <p:transition spd="slow">
         <p:fade/>
       </p:transition>
@@ -10470,7 +10478,7 @@
         <p:fade/>
       </p:transition>
     </mc:Choice>
-    <mc:Fallback xmlns:ahyp="http://schemas.microsoft.com/office/drawing/2018/hyperlinkcolor" xmlns:p15="http://schemas.microsoft.com/office/powerpoint/2012/main" xmlns:com="http://schemas.openxmlformats.org/drawingml/2006/compatibility" xmlns:pvml="urn:schemas-microsoft-com:office:powerpoint" xmlns:v="urn:schemas-microsoft-com:vml" xmlns:o="urn:schemas-microsoft-com:office:office" xmlns:dgm="http://schemas.openxmlformats.org/drawingml/2006/diagram" xmlns:c="http://schemas.openxmlformats.org/drawingml/2006/chart" xmlns:mv="urn:schemas-microsoft-com:mac:vml" xmlns="">
+    <mc:Fallback xmlns="" xmlns:mv="urn:schemas-microsoft-com:mac:vml" xmlns:c="http://schemas.openxmlformats.org/drawingml/2006/chart" xmlns:dgm="http://schemas.openxmlformats.org/drawingml/2006/diagram" xmlns:o="urn:schemas-microsoft-com:office:office" xmlns:v="urn:schemas-microsoft-com:vml" xmlns:pvml="urn:schemas-microsoft-com:office:powerpoint" xmlns:com="http://schemas.openxmlformats.org/drawingml/2006/compatibility" xmlns:p15="http://schemas.microsoft.com/office/powerpoint/2012/main" xmlns:ahyp="http://schemas.microsoft.com/office/drawing/2018/hyperlinkcolor">
       <p:transition spd="slow">
         <p:fade/>
       </p:transition>
@@ -11645,7 +11653,7 @@
         <p:fade/>
       </p:transition>
     </mc:Choice>
-    <mc:Fallback xmlns:ahyp="http://schemas.microsoft.com/office/drawing/2018/hyperlinkcolor" xmlns:p15="http://schemas.microsoft.com/office/powerpoint/2012/main" xmlns:com="http://schemas.openxmlformats.org/drawingml/2006/compatibility" xmlns:pvml="urn:schemas-microsoft-com:office:powerpoint" xmlns:v="urn:schemas-microsoft-com:vml" xmlns:o="urn:schemas-microsoft-com:office:office" xmlns:dgm="http://schemas.openxmlformats.org/drawingml/2006/diagram" xmlns:c="http://schemas.openxmlformats.org/drawingml/2006/chart" xmlns:mv="urn:schemas-microsoft-com:mac:vml" xmlns="">
+    <mc:Fallback xmlns="" xmlns:mv="urn:schemas-microsoft-com:mac:vml" xmlns:c="http://schemas.openxmlformats.org/drawingml/2006/chart" xmlns:dgm="http://schemas.openxmlformats.org/drawingml/2006/diagram" xmlns:o="urn:schemas-microsoft-com:office:office" xmlns:v="urn:schemas-microsoft-com:vml" xmlns:pvml="urn:schemas-microsoft-com:office:powerpoint" xmlns:com="http://schemas.openxmlformats.org/drawingml/2006/compatibility" xmlns:p15="http://schemas.microsoft.com/office/powerpoint/2012/main" xmlns:ahyp="http://schemas.microsoft.com/office/drawing/2018/hyperlinkcolor">
       <p:transition spd="slow">
         <p:fade/>
       </p:transition>
@@ -13194,7 +13202,7 @@
         <p:fade/>
       </p:transition>
     </mc:Choice>
-    <mc:Fallback xmlns:ahyp="http://schemas.microsoft.com/office/drawing/2018/hyperlinkcolor" xmlns:p15="http://schemas.microsoft.com/office/powerpoint/2012/main" xmlns:com="http://schemas.openxmlformats.org/drawingml/2006/compatibility" xmlns:pvml="urn:schemas-microsoft-com:office:powerpoint" xmlns:v="urn:schemas-microsoft-com:vml" xmlns:o="urn:schemas-microsoft-com:office:office" xmlns:dgm="http://schemas.openxmlformats.org/drawingml/2006/diagram" xmlns:c="http://schemas.openxmlformats.org/drawingml/2006/chart" xmlns:mv="urn:schemas-microsoft-com:mac:vml" xmlns="">
+    <mc:Fallback xmlns="" xmlns:mv="urn:schemas-microsoft-com:mac:vml" xmlns:c="http://schemas.openxmlformats.org/drawingml/2006/chart" xmlns:dgm="http://schemas.openxmlformats.org/drawingml/2006/diagram" xmlns:o="urn:schemas-microsoft-com:office:office" xmlns:v="urn:schemas-microsoft-com:vml" xmlns:pvml="urn:schemas-microsoft-com:office:powerpoint" xmlns:com="http://schemas.openxmlformats.org/drawingml/2006/compatibility" xmlns:p15="http://schemas.microsoft.com/office/powerpoint/2012/main" xmlns:ahyp="http://schemas.microsoft.com/office/drawing/2018/hyperlinkcolor">
       <p:transition spd="slow">
         <p:fade/>
       </p:transition>
@@ -13995,7 +14003,7 @@
         <p:fade/>
       </p:transition>
     </mc:Choice>
-    <mc:Fallback xmlns:ahyp="http://schemas.microsoft.com/office/drawing/2018/hyperlinkcolor" xmlns:p15="http://schemas.microsoft.com/office/powerpoint/2012/main" xmlns:com="http://schemas.openxmlformats.org/drawingml/2006/compatibility" xmlns:pvml="urn:schemas-microsoft-com:office:powerpoint" xmlns:v="urn:schemas-microsoft-com:vml" xmlns:o="urn:schemas-microsoft-com:office:office" xmlns:dgm="http://schemas.openxmlformats.org/drawingml/2006/diagram" xmlns:c="http://schemas.openxmlformats.org/drawingml/2006/chart" xmlns:mv="urn:schemas-microsoft-com:mac:vml" xmlns="">
+    <mc:Fallback xmlns="" xmlns:mv="urn:schemas-microsoft-com:mac:vml" xmlns:c="http://schemas.openxmlformats.org/drawingml/2006/chart" xmlns:dgm="http://schemas.openxmlformats.org/drawingml/2006/diagram" xmlns:o="urn:schemas-microsoft-com:office:office" xmlns:v="urn:schemas-microsoft-com:vml" xmlns:pvml="urn:schemas-microsoft-com:office:powerpoint" xmlns:com="http://schemas.openxmlformats.org/drawingml/2006/compatibility" xmlns:p15="http://schemas.microsoft.com/office/powerpoint/2012/main" xmlns:ahyp="http://schemas.microsoft.com/office/drawing/2018/hyperlinkcolor">
       <p:transition spd="slow">
         <p:fade/>
       </p:transition>
@@ -15171,7 +15179,7 @@
         <p:fade/>
       </p:transition>
     </mc:Choice>
-    <mc:Fallback xmlns:ahyp="http://schemas.microsoft.com/office/drawing/2018/hyperlinkcolor" xmlns:p15="http://schemas.microsoft.com/office/powerpoint/2012/main" xmlns:com="http://schemas.openxmlformats.org/drawingml/2006/compatibility" xmlns:pvml="urn:schemas-microsoft-com:office:powerpoint" xmlns:v="urn:schemas-microsoft-com:vml" xmlns:o="urn:schemas-microsoft-com:office:office" xmlns:dgm="http://schemas.openxmlformats.org/drawingml/2006/diagram" xmlns:c="http://schemas.openxmlformats.org/drawingml/2006/chart" xmlns:mv="urn:schemas-microsoft-com:mac:vml" xmlns="">
+    <mc:Fallback xmlns="" xmlns:mv="urn:schemas-microsoft-com:mac:vml" xmlns:c="http://schemas.openxmlformats.org/drawingml/2006/chart" xmlns:dgm="http://schemas.openxmlformats.org/drawingml/2006/diagram" xmlns:o="urn:schemas-microsoft-com:office:office" xmlns:v="urn:schemas-microsoft-com:vml" xmlns:pvml="urn:schemas-microsoft-com:office:powerpoint" xmlns:com="http://schemas.openxmlformats.org/drawingml/2006/compatibility" xmlns:p15="http://schemas.microsoft.com/office/powerpoint/2012/main" xmlns:ahyp="http://schemas.microsoft.com/office/drawing/2018/hyperlinkcolor">
       <p:transition spd="slow">
         <p:fade/>
       </p:transition>
@@ -17160,7 +17168,7 @@
         <p:fade/>
       </p:transition>
     </mc:Choice>
-    <mc:Fallback xmlns:ahyp="http://schemas.microsoft.com/office/drawing/2018/hyperlinkcolor" xmlns:p15="http://schemas.microsoft.com/office/powerpoint/2012/main" xmlns:com="http://schemas.openxmlformats.org/drawingml/2006/compatibility" xmlns:pvml="urn:schemas-microsoft-com:office:powerpoint" xmlns:v="urn:schemas-microsoft-com:vml" xmlns:o="urn:schemas-microsoft-com:office:office" xmlns:dgm="http://schemas.openxmlformats.org/drawingml/2006/diagram" xmlns:c="http://schemas.openxmlformats.org/drawingml/2006/chart" xmlns:mv="urn:schemas-microsoft-com:mac:vml" xmlns="">
+    <mc:Fallback xmlns="" xmlns:mv="urn:schemas-microsoft-com:mac:vml" xmlns:c="http://schemas.openxmlformats.org/drawingml/2006/chart" xmlns:dgm="http://schemas.openxmlformats.org/drawingml/2006/diagram" xmlns:o="urn:schemas-microsoft-com:office:office" xmlns:v="urn:schemas-microsoft-com:vml" xmlns:pvml="urn:schemas-microsoft-com:office:powerpoint" xmlns:com="http://schemas.openxmlformats.org/drawingml/2006/compatibility" xmlns:p15="http://schemas.microsoft.com/office/powerpoint/2012/main" xmlns:ahyp="http://schemas.microsoft.com/office/drawing/2018/hyperlinkcolor">
       <p:transition spd="slow">
         <p:fade/>
       </p:transition>
@@ -18148,7 +18156,7 @@
         <p:fade/>
       </p:transition>
     </mc:Choice>
-    <mc:Fallback xmlns:ahyp="http://schemas.microsoft.com/office/drawing/2018/hyperlinkcolor" xmlns:p15="http://schemas.microsoft.com/office/powerpoint/2012/main" xmlns:com="http://schemas.openxmlformats.org/drawingml/2006/compatibility" xmlns:pvml="urn:schemas-microsoft-com:office:powerpoint" xmlns:v="urn:schemas-microsoft-com:vml" xmlns:o="urn:schemas-microsoft-com:office:office" xmlns:dgm="http://schemas.openxmlformats.org/drawingml/2006/diagram" xmlns:c="http://schemas.openxmlformats.org/drawingml/2006/chart" xmlns:mv="urn:schemas-microsoft-com:mac:vml" xmlns="">
+    <mc:Fallback xmlns="" xmlns:mv="urn:schemas-microsoft-com:mac:vml" xmlns:c="http://schemas.openxmlformats.org/drawingml/2006/chart" xmlns:dgm="http://schemas.openxmlformats.org/drawingml/2006/diagram" xmlns:o="urn:schemas-microsoft-com:office:office" xmlns:v="urn:schemas-microsoft-com:vml" xmlns:pvml="urn:schemas-microsoft-com:office:powerpoint" xmlns:com="http://schemas.openxmlformats.org/drawingml/2006/compatibility" xmlns:p15="http://schemas.microsoft.com/office/powerpoint/2012/main" xmlns:ahyp="http://schemas.microsoft.com/office/drawing/2018/hyperlinkcolor">
       <p:transition spd="slow">
         <p:fade/>
       </p:transition>
@@ -19136,7 +19144,7 @@
         <p:fade/>
       </p:transition>
     </mc:Choice>
-    <mc:Fallback xmlns:ahyp="http://schemas.microsoft.com/office/drawing/2018/hyperlinkcolor" xmlns:p15="http://schemas.microsoft.com/office/powerpoint/2012/main" xmlns:com="http://schemas.openxmlformats.org/drawingml/2006/compatibility" xmlns:pvml="urn:schemas-microsoft-com:office:powerpoint" xmlns:v="urn:schemas-microsoft-com:vml" xmlns:o="urn:schemas-microsoft-com:office:office" xmlns:dgm="http://schemas.openxmlformats.org/drawingml/2006/diagram" xmlns:c="http://schemas.openxmlformats.org/drawingml/2006/chart" xmlns:mv="urn:schemas-microsoft-com:mac:vml" xmlns="">
+    <mc:Fallback xmlns="" xmlns:mv="urn:schemas-microsoft-com:mac:vml" xmlns:c="http://schemas.openxmlformats.org/drawingml/2006/chart" xmlns:dgm="http://schemas.openxmlformats.org/drawingml/2006/diagram" xmlns:o="urn:schemas-microsoft-com:office:office" xmlns:v="urn:schemas-microsoft-com:vml" xmlns:pvml="urn:schemas-microsoft-com:office:powerpoint" xmlns:com="http://schemas.openxmlformats.org/drawingml/2006/compatibility" xmlns:p15="http://schemas.microsoft.com/office/powerpoint/2012/main" xmlns:ahyp="http://schemas.microsoft.com/office/drawing/2018/hyperlinkcolor">
       <p:transition spd="slow">
         <p:fade/>
       </p:transition>
@@ -29869,7 +29877,7 @@
         <p:fade/>
       </p:transition>
     </mc:Choice>
-    <mc:Fallback xmlns:ahyp="http://schemas.microsoft.com/office/drawing/2018/hyperlinkcolor" xmlns:p15="http://schemas.microsoft.com/office/powerpoint/2012/main" xmlns:com="http://schemas.openxmlformats.org/drawingml/2006/compatibility" xmlns:pvml="urn:schemas-microsoft-com:office:powerpoint" xmlns:v="urn:schemas-microsoft-com:vml" xmlns:o="urn:schemas-microsoft-com:office:office" xmlns:dgm="http://schemas.openxmlformats.org/drawingml/2006/diagram" xmlns:c="http://schemas.openxmlformats.org/drawingml/2006/chart" xmlns:mv="urn:schemas-microsoft-com:mac:vml" xmlns="">
+    <mc:Fallback xmlns="" xmlns:mv="urn:schemas-microsoft-com:mac:vml" xmlns:c="http://schemas.openxmlformats.org/drawingml/2006/chart" xmlns:dgm="http://schemas.openxmlformats.org/drawingml/2006/diagram" xmlns:o="urn:schemas-microsoft-com:office:office" xmlns:v="urn:schemas-microsoft-com:vml" xmlns:pvml="urn:schemas-microsoft-com:office:powerpoint" xmlns:com="http://schemas.openxmlformats.org/drawingml/2006/compatibility" xmlns:p15="http://schemas.microsoft.com/office/powerpoint/2012/main" xmlns:ahyp="http://schemas.microsoft.com/office/drawing/2018/hyperlinkcolor">
       <p:transition spd="slow">
         <p:fade/>
       </p:transition>
@@ -31294,7 +31302,7 @@
         <p:fade/>
       </p:transition>
     </mc:Choice>
-    <mc:Fallback xmlns:ahyp="http://schemas.microsoft.com/office/drawing/2018/hyperlinkcolor" xmlns:p15="http://schemas.microsoft.com/office/powerpoint/2012/main" xmlns:com="http://schemas.openxmlformats.org/drawingml/2006/compatibility" xmlns:pvml="urn:schemas-microsoft-com:office:powerpoint" xmlns:v="urn:schemas-microsoft-com:vml" xmlns:o="urn:schemas-microsoft-com:office:office" xmlns:dgm="http://schemas.openxmlformats.org/drawingml/2006/diagram" xmlns:c="http://schemas.openxmlformats.org/drawingml/2006/chart" xmlns:mv="urn:schemas-microsoft-com:mac:vml" xmlns="">
+    <mc:Fallback xmlns="" xmlns:mv="urn:schemas-microsoft-com:mac:vml" xmlns:c="http://schemas.openxmlformats.org/drawingml/2006/chart" xmlns:dgm="http://schemas.openxmlformats.org/drawingml/2006/diagram" xmlns:o="urn:schemas-microsoft-com:office:office" xmlns:v="urn:schemas-microsoft-com:vml" xmlns:pvml="urn:schemas-microsoft-com:office:powerpoint" xmlns:com="http://schemas.openxmlformats.org/drawingml/2006/compatibility" xmlns:p15="http://schemas.microsoft.com/office/powerpoint/2012/main" xmlns:ahyp="http://schemas.microsoft.com/office/drawing/2018/hyperlinkcolor">
       <p:transition spd="slow">
         <p:fade/>
       </p:transition>
@@ -31393,14 +31401,14 @@
           <p:nvPr>
             <p:extLst>
               <p:ext uri="{D42A27DB-BD31-4B8C-83A1-F6EECF244321}">
-                <p14:modId xmlns:p14="http://schemas.microsoft.com/office/powerpoint/2010/main" val="533701987"/>
+                <p14:modId xmlns:p14="http://schemas.microsoft.com/office/powerpoint/2010/main" val="3138376155"/>
               </p:ext>
             </p:extLst>
           </p:nvPr>
         </p:nvGraphicFramePr>
         <p:xfrm>
           <a:off x="990479" y="1022632"/>
-          <a:ext cx="10406975" cy="5600000"/>
+          <a:ext cx="10406975" cy="5040000"/>
         </p:xfrm>
         <a:graphic>
           <a:graphicData uri="http://schemas.openxmlformats.org/drawingml/2006/table">
@@ -32841,74 +32849,6 @@
                       <a:headEnd type="none" w="sm" len="sm"/>
                       <a:tailEnd type="none" w="sm" len="sm"/>
                     </a:lnL>
-                    <a:lnR w="12700" cap="flat" cmpd="sng">
-                      <a:solidFill>
-                        <a:schemeClr val="dk1"/>
-                      </a:solidFill>
-                      <a:prstDash val="solid"/>
-                      <a:round/>
-                      <a:headEnd type="none" w="sm" len="sm"/>
-                      <a:tailEnd type="none" w="sm" len="sm"/>
-                    </a:lnR>
-                    <a:lnT w="12700" cap="flat" cmpd="sng">
-                      <a:solidFill>
-                        <a:schemeClr val="dk1"/>
-                      </a:solidFill>
-                      <a:prstDash val="solid"/>
-                      <a:round/>
-                      <a:headEnd type="none" w="sm" len="sm"/>
-                      <a:tailEnd type="none" w="sm" len="sm"/>
-                    </a:lnT>
-                    <a:lnB w="12700" cap="flat" cmpd="sng">
-                      <a:solidFill>
-                        <a:schemeClr val="dk1"/>
-                      </a:solidFill>
-                      <a:prstDash val="solid"/>
-                      <a:round/>
-                      <a:headEnd type="none" w="sm" len="sm"/>
-                      <a:tailEnd type="none" w="sm" len="sm"/>
-                    </a:lnB>
-                  </a:tcPr>
-                </a:tc>
-                <a:tc>
-                  <a:txBody>
-                    <a:bodyPr/>
-                    <a:lstStyle/>
-                    <a:p>
-                      <a:pPr marL="0" marR="0" lvl="0" indent="0" algn="ctr" rtl="0">
-                        <a:lnSpc>
-                          <a:spcPct val="100000"/>
-                        </a:lnSpc>
-                        <a:spcBef>
-                          <a:spcPts val="0"/>
-                        </a:spcBef>
-                        <a:spcAft>
-                          <a:spcPts val="0"/>
-                        </a:spcAft>
-                        <a:buClr>
-                          <a:srgbClr val="000000"/>
-                        </a:buClr>
-                        <a:buSzPts val="2400"/>
-                        <a:buFont typeface="Arial"/>
-                        <a:buNone/>
-                      </a:pPr>
-                      <a:endParaRPr sz="2400" u="none" strike="noStrike" cap="none">
-                        <a:solidFill>
-                          <a:srgbClr val="002060"/>
-                        </a:solidFill>
-                      </a:endParaRPr>
-                    </a:p>
-                  </a:txBody>
-                  <a:tcPr marL="91450" marR="91450" marT="45725" marB="45725" anchor="ctr">
-                    <a:lnL w="12700" cap="flat" cmpd="sng">
-                      <a:solidFill>
-                        <a:schemeClr val="dk1"/>
-                      </a:solidFill>
-                      <a:prstDash val="solid"/>
-                      <a:round/>
-                      <a:headEnd type="none" w="sm" len="sm"/>
-                      <a:tailEnd type="none" w="sm" len="sm"/>
-                    </a:lnL>
                     <a:lnR w="12700" cap="flat" cmpd="sng" algn="ctr">
                       <a:solidFill>
                         <a:schemeClr val="dk1"/>
@@ -32918,175 +32858,7 @@
                       <a:headEnd type="none" w="sm" len="sm"/>
                       <a:tailEnd type="none" w="sm" len="sm"/>
                     </a:lnR>
-                    <a:lnT w="12700" cap="flat" cmpd="sng">
-                      <a:solidFill>
-                        <a:schemeClr val="dk1"/>
-                      </a:solidFill>
-                      <a:prstDash val="solid"/>
-                      <a:round/>
-                      <a:headEnd type="none" w="sm" len="sm"/>
-                      <a:tailEnd type="none" w="sm" len="sm"/>
-                    </a:lnT>
-                    <a:lnB w="12700" cap="flat" cmpd="sng">
-                      <a:solidFill>
-                        <a:schemeClr val="dk1"/>
-                      </a:solidFill>
-                      <a:prstDash val="solid"/>
-                      <a:round/>
-                      <a:headEnd type="none" w="sm" len="sm"/>
-                      <a:tailEnd type="none" w="sm" len="sm"/>
-                    </a:lnB>
-                  </a:tcPr>
-                </a:tc>
-                <a:tc>
-                  <a:txBody>
-                    <a:bodyPr/>
-                    <a:lstStyle/>
-                    <a:p>
-                      <a:pPr marL="0" marR="0" lvl="0" indent="0" algn="l" defTabSz="914400" rtl="0" eaLnBrk="1" fontAlgn="base" latinLnBrk="0" hangingPunct="1">
-                        <a:lnSpc>
-                          <a:spcPct val="100000"/>
-                        </a:lnSpc>
-                        <a:spcBef>
-                          <a:spcPct val="0"/>
-                        </a:spcBef>
-                        <a:spcAft>
-                          <a:spcPct val="0"/>
-                        </a:spcAft>
-                        <a:buClrTx/>
-                        <a:buSzTx/>
-                        <a:buFontTx/>
-                        <a:buNone/>
-                        <a:tabLst/>
-                      </a:pPr>
-                      <a:r>
-                        <a:rPr kumimoji="0" lang="en-US" altLang="id-ID" sz="1800" b="0" i="0" u="none" strike="noStrike" cap="none" normalizeH="0" baseline="0">
-                          <a:ln>
-                            <a:noFill/>
-                          </a:ln>
-                          <a:solidFill>
-                            <a:schemeClr val="tx1"/>
-                          </a:solidFill>
-                          <a:effectLst/>
-                          <a:latin typeface="+mn-lt"/>
-                          <a:ea typeface="Tahoma" panose="020B0604030504040204" pitchFamily="34" charset="0"/>
-                          <a:cs typeface="Times New Roman" panose="02020603050405020304" pitchFamily="18" charset="0"/>
-                        </a:rPr>
-                        <a:t>Clustering Analysis Advanced</a:t>
-                      </a:r>
-                      <a:endParaRPr kumimoji="0" lang="en-US" altLang="id-ID" sz="1800" b="0" i="0" u="none" strike="noStrike" cap="none" normalizeH="0" baseline="0" dirty="0">
-                        <a:ln>
-                          <a:noFill/>
-                        </a:ln>
-                        <a:solidFill>
-                          <a:schemeClr val="tx1"/>
-                        </a:solidFill>
-                        <a:effectLst/>
-                        <a:latin typeface="+mn-lt"/>
-                        <a:ea typeface="Tahoma" panose="020B0604030504040204" pitchFamily="34" charset="0"/>
-                        <a:cs typeface="Times New Roman" panose="02020603050405020304" pitchFamily="18" charset="0"/>
-                      </a:endParaRPr>
-                    </a:p>
-                  </a:txBody>
-                  <a:tcPr marL="68588" marR="68588" marT="34294" marB="34294">
-                    <a:lnL w="12700" cap="flat" cmpd="sng">
-                      <a:solidFill>
-                        <a:schemeClr val="dk1"/>
-                      </a:solidFill>
-                      <a:prstDash val="solid"/>
-                      <a:round/>
-                      <a:headEnd type="none" w="sm" len="sm"/>
-                      <a:tailEnd type="none" w="sm" len="sm"/>
-                    </a:lnL>
-                    <a:lnR w="12700" cap="flat" cmpd="sng">
-                      <a:solidFill>
-                        <a:schemeClr val="dk1"/>
-                      </a:solidFill>
-                      <a:prstDash val="solid"/>
-                      <a:round/>
-                      <a:headEnd type="none" w="sm" len="sm"/>
-                      <a:tailEnd type="none" w="sm" len="sm"/>
-                    </a:lnR>
-                    <a:lnT w="12700" cap="flat" cmpd="sng">
-                      <a:solidFill>
-                        <a:schemeClr val="dk1"/>
-                      </a:solidFill>
-                      <a:prstDash val="solid"/>
-                      <a:round/>
-                      <a:headEnd type="none" w="sm" len="sm"/>
-                      <a:tailEnd type="none" w="sm" len="sm"/>
-                    </a:lnT>
-                    <a:lnB w="12700" cap="flat" cmpd="sng">
-                      <a:solidFill>
-                        <a:schemeClr val="dk1"/>
-                      </a:solidFill>
-                      <a:prstDash val="solid"/>
-                      <a:round/>
-                      <a:headEnd type="none" w="sm" len="sm"/>
-                      <a:tailEnd type="none" w="sm" len="sm"/>
-                    </a:lnB>
-                  </a:tcPr>
-                </a:tc>
-                <a:extLst>
-                  <a:ext uri="{0D108BD9-81ED-4DB2-BD59-A6C34878D82A}">
-                    <a16:rowId xmlns:a16="http://schemas.microsoft.com/office/drawing/2014/main" val="10006"/>
-                  </a:ext>
-                </a:extLst>
-              </a:tr>
-              <a:tr h="560000">
-                <a:tc>
-                  <a:txBody>
-                    <a:bodyPr/>
-                    <a:lstStyle/>
-                    <a:p>
-                      <a:pPr marL="0" marR="0" lvl="0" indent="0" algn="ctr" rtl="0">
-                        <a:lnSpc>
-                          <a:spcPct val="100000"/>
-                        </a:lnSpc>
-                        <a:spcBef>
-                          <a:spcPts val="0"/>
-                        </a:spcBef>
-                        <a:spcAft>
-                          <a:spcPts val="0"/>
-                        </a:spcAft>
-                        <a:buClr>
-                          <a:srgbClr val="000000"/>
-                        </a:buClr>
-                        <a:buSzPts val="2400"/>
-                        <a:buFont typeface="Arial"/>
-                        <a:buNone/>
-                      </a:pPr>
-                      <a:r>
-                        <a:rPr lang="en-US" sz="2400" u="none" strike="noStrike" cap="none">
-                          <a:solidFill>
-                            <a:srgbClr val="002060"/>
-                          </a:solidFill>
-                        </a:rPr>
-                        <a:t>7</a:t>
-                      </a:r>
-                      <a:endParaRPr sz="1400" u="none" strike="noStrike" cap="none"/>
-                    </a:p>
-                  </a:txBody>
-                  <a:tcPr marL="91450" marR="91450" marT="45725" marB="45725" anchor="ctr">
-                    <a:lnL w="12700" cap="flat" cmpd="sng">
-                      <a:solidFill>
-                        <a:schemeClr val="dk1"/>
-                      </a:solidFill>
-                      <a:prstDash val="solid"/>
-                      <a:round/>
-                      <a:headEnd type="none" w="sm" len="sm"/>
-                      <a:tailEnd type="none" w="sm" len="sm"/>
-                    </a:lnL>
-                    <a:lnR w="12700" cap="flat" cmpd="sng">
-                      <a:solidFill>
-                        <a:schemeClr val="dk1"/>
-                      </a:solidFill>
-                      <a:prstDash val="solid"/>
-                      <a:round/>
-                      <a:headEnd type="none" w="sm" len="sm"/>
-                      <a:tailEnd type="none" w="sm" len="sm"/>
-                    </a:lnR>
-                    <a:lnT w="12700" cap="flat" cmpd="sng">
+                    <a:lnT w="12700" cap="flat" cmpd="sng" algn="ctr">
                       <a:solidFill>
                         <a:schemeClr val="dk1"/>
                       </a:solidFill>
@@ -33136,7 +32908,7 @@
                     </a:p>
                   </a:txBody>
                   <a:tcPr marL="91450" marR="91450" marT="45725" marB="45725" anchor="ctr">
-                    <a:lnL w="12700" cap="flat" cmpd="sng">
+                    <a:lnL w="12700" cap="flat" cmpd="sng" algn="ctr">
                       <a:solidFill>
                         <a:schemeClr val="dk1"/>
                       </a:solidFill>
@@ -33154,7 +32926,7 @@
                       <a:headEnd type="none" w="sm" len="sm"/>
                       <a:tailEnd type="none" w="sm" len="sm"/>
                     </a:lnR>
-                    <a:lnT w="12700" cap="flat" cmpd="sng">
+                    <a:lnT w="12700" cap="flat" cmpd="sng" algn="ctr">
                       <a:solidFill>
                         <a:schemeClr val="dk1"/>
                       </a:solidFill>
@@ -33225,7 +32997,7 @@
                     </a:p>
                   </a:txBody>
                   <a:tcPr marL="68588" marR="68588" marT="34294" marB="34294">
-                    <a:lnL w="12700" cap="flat" cmpd="sng">
+                    <a:lnL w="12700" cap="flat" cmpd="sng" algn="ctr">
                       <a:solidFill>
                         <a:schemeClr val="dk1"/>
                       </a:solidFill>
@@ -33243,7 +33015,7 @@
                       <a:headEnd type="none" w="sm" len="sm"/>
                       <a:tailEnd type="none" w="sm" len="sm"/>
                     </a:lnR>
-                    <a:lnT w="12700" cap="flat" cmpd="sng">
+                    <a:lnT w="12700" cap="flat" cmpd="sng" algn="ctr">
                       <a:solidFill>
                         <a:schemeClr val="dk1"/>
                       </a:solidFill>
@@ -33298,7 +33070,7 @@
                             <a:srgbClr val="002060"/>
                           </a:solidFill>
                         </a:rPr>
-                        <a:t>8</a:t>
+                        <a:t>7</a:t>
                       </a:r>
                       <a:endParaRPr sz="1400" u="none" strike="noStrike" cap="none"/>
                     </a:p>
@@ -33537,7 +33309,7 @@
                             <a:srgbClr val="002060"/>
                           </a:solidFill>
                         </a:rPr>
-                        <a:t>9</a:t>
+                        <a:t>8</a:t>
                       </a:r>
                       <a:endParaRPr sz="1400" u="none" strike="noStrike" cap="none" dirty="0"/>
                     </a:p>
@@ -33756,7 +33528,7 @@
         <p:fade/>
       </p:transition>
     </mc:Choice>
-    <mc:Fallback xmlns:ahyp="http://schemas.microsoft.com/office/drawing/2018/hyperlinkcolor" xmlns:p15="http://schemas.microsoft.com/office/powerpoint/2012/main" xmlns:com="http://schemas.openxmlformats.org/drawingml/2006/compatibility" xmlns:pvml="urn:schemas-microsoft-com:office:powerpoint" xmlns:v="urn:schemas-microsoft-com:vml" xmlns:o="urn:schemas-microsoft-com:office:office" xmlns:dgm="http://schemas.openxmlformats.org/drawingml/2006/diagram" xmlns:c="http://schemas.openxmlformats.org/drawingml/2006/chart" xmlns:mv="urn:schemas-microsoft-com:mac:vml" xmlns="">
+    <mc:Fallback xmlns="" xmlns:mv="urn:schemas-microsoft-com:mac:vml" xmlns:c="http://schemas.openxmlformats.org/drawingml/2006/chart" xmlns:dgm="http://schemas.openxmlformats.org/drawingml/2006/diagram" xmlns:o="urn:schemas-microsoft-com:office:office" xmlns:v="urn:schemas-microsoft-com:vml" xmlns:pvml="urn:schemas-microsoft-com:office:powerpoint" xmlns:com="http://schemas.openxmlformats.org/drawingml/2006/compatibility" xmlns:p15="http://schemas.microsoft.com/office/powerpoint/2012/main" xmlns:ahyp="http://schemas.microsoft.com/office/drawing/2018/hyperlinkcolor">
       <p:transition spd="slow">
         <p:fade/>
       </p:transition>
@@ -33855,14 +33627,14 @@
           <p:nvPr>
             <p:extLst>
               <p:ext uri="{D42A27DB-BD31-4B8C-83A1-F6EECF244321}">
-                <p14:modId xmlns:p14="http://schemas.microsoft.com/office/powerpoint/2010/main" val="2611052046"/>
+                <p14:modId xmlns:p14="http://schemas.microsoft.com/office/powerpoint/2010/main" val="4087513175"/>
               </p:ext>
             </p:extLst>
           </p:nvPr>
         </p:nvGraphicFramePr>
         <p:xfrm>
           <a:off x="892511" y="943214"/>
-          <a:ext cx="10406975" cy="5105245"/>
+          <a:ext cx="10406975" cy="4595570"/>
         </p:xfrm>
         <a:graphic>
           <a:graphicData uri="http://schemas.openxmlformats.org/drawingml/2006/table">
@@ -34106,12 +33878,12 @@
                         <a:buNone/>
                       </a:pPr>
                       <a:r>
-                        <a:rPr lang="en-US" sz="2400" u="none" strike="noStrike" cap="none" dirty="0">
+                        <a:rPr lang="en-US" sz="2400" u="none" strike="noStrike" cap="none">
                           <a:solidFill>
                             <a:srgbClr val="002060"/>
                           </a:solidFill>
                         </a:rPr>
-                        <a:t>10</a:t>
+                        <a:t>9</a:t>
                       </a:r>
                       <a:endParaRPr sz="1400" u="none" strike="noStrike" cap="none" dirty="0"/>
                     </a:p>
@@ -34341,7 +34113,7 @@
                             <a:srgbClr val="002060"/>
                           </a:solidFill>
                         </a:rPr>
-                        <a:t>11</a:t>
+                        <a:t>10</a:t>
                       </a:r>
                       <a:endParaRPr sz="1400" u="none" strike="noStrike" cap="none"/>
                     </a:p>
@@ -34356,7 +34128,7 @@
                       <a:headEnd type="none" w="sm" len="sm"/>
                       <a:tailEnd type="none" w="sm" len="sm"/>
                     </a:lnL>
-                    <a:lnR w="12700" cap="flat" cmpd="sng">
+                    <a:lnR w="12700" cap="flat" cmpd="sng" algn="ctr">
                       <a:solidFill>
                         <a:schemeClr val="dk1"/>
                       </a:solidFill>
@@ -34365,7 +34137,7 @@
                       <a:headEnd type="none" w="sm" len="sm"/>
                       <a:tailEnd type="none" w="sm" len="sm"/>
                     </a:lnR>
-                    <a:lnT w="12700" cap="flat" cmpd="sng">
+                    <a:lnT w="12700" cap="flat" cmpd="sng" algn="ctr">
                       <a:solidFill>
                         <a:schemeClr val="dk1"/>
                       </a:solidFill>
@@ -34411,7 +34183,7 @@
                     </a:p>
                   </a:txBody>
                   <a:tcPr marL="91450" marR="91450" marT="45725" marB="45725" anchor="ctr">
-                    <a:lnL w="12700" cap="flat" cmpd="sng">
+                    <a:lnL w="12700" cap="flat" cmpd="sng" algn="ctr">
                       <a:solidFill>
                         <a:schemeClr val="dk1"/>
                       </a:solidFill>
@@ -34429,240 +34201,7 @@
                       <a:headEnd type="none" w="sm" len="sm"/>
                       <a:tailEnd type="none" w="sm" len="sm"/>
                     </a:lnR>
-                    <a:lnT w="12700" cap="flat" cmpd="sng">
-                      <a:solidFill>
-                        <a:schemeClr val="dk1"/>
-                      </a:solidFill>
-                      <a:prstDash val="solid"/>
-                      <a:round/>
-                      <a:headEnd type="none" w="sm" len="sm"/>
-                      <a:tailEnd type="none" w="sm" len="sm"/>
-                    </a:lnT>
-                    <a:lnB w="12700" cap="flat" cmpd="sng">
-                      <a:solidFill>
-                        <a:schemeClr val="dk1"/>
-                      </a:solidFill>
-                      <a:prstDash val="solid"/>
-                      <a:round/>
-                      <a:headEnd type="none" w="sm" len="sm"/>
-                      <a:tailEnd type="none" w="sm" len="sm"/>
-                    </a:lnB>
-                  </a:tcPr>
-                </a:tc>
-                <a:tc>
-                  <a:txBody>
-                    <a:bodyPr/>
-                    <a:lstStyle/>
-                    <a:p>
-                      <a:pPr marL="0" marR="0" lvl="0" indent="0" algn="l" defTabSz="914400" rtl="0" eaLnBrk="1" fontAlgn="base" latinLnBrk="0" hangingPunct="1">
-                        <a:lnSpc>
-                          <a:spcPct val="100000"/>
-                        </a:lnSpc>
-                        <a:spcBef>
-                          <a:spcPct val="0"/>
-                        </a:spcBef>
-                        <a:spcAft>
-                          <a:spcPct val="0"/>
-                        </a:spcAft>
-                        <a:buClrTx/>
-                        <a:buSzTx/>
-                        <a:buFontTx/>
-                        <a:buNone/>
-                        <a:tabLst/>
-                        <a:defRPr/>
-                      </a:pPr>
-                      <a:r>
-                        <a:rPr kumimoji="0" lang="en-US" altLang="id-ID" sz="1800" b="1" i="0" u="none" strike="noStrike" kern="1200" cap="none" normalizeH="0" baseline="0">
-                          <a:ln>
-                            <a:noFill/>
-                          </a:ln>
-                          <a:solidFill>
-                            <a:schemeClr val="tx1"/>
-                          </a:solidFill>
-                          <a:effectLst/>
-                          <a:latin typeface="+mn-lt"/>
-                          <a:ea typeface="+mn-ea"/>
-                          <a:cs typeface="Times New Roman" panose="02020603050405020304" pitchFamily="18" charset="0"/>
-                        </a:rPr>
-                        <a:t>Case Study – 03: Correlation and Regression</a:t>
-                      </a:r>
-                      <a:endParaRPr kumimoji="0" lang="en-US" altLang="id-ID" sz="1800" b="1" i="0" u="none" strike="noStrike" kern="1200" cap="none" normalizeH="0" baseline="0" dirty="0">
-                        <a:ln>
-                          <a:noFill/>
-                        </a:ln>
-                        <a:solidFill>
-                          <a:schemeClr val="tx1"/>
-                        </a:solidFill>
-                        <a:effectLst/>
-                        <a:latin typeface="+mn-lt"/>
-                        <a:ea typeface="+mn-ea"/>
-                        <a:cs typeface="Times New Roman" panose="02020603050405020304" pitchFamily="18" charset="0"/>
-                      </a:endParaRPr>
-                    </a:p>
-                  </a:txBody>
-                  <a:tcPr marL="68588" marR="68588" marT="34294" marB="34294">
-                    <a:lnL w="12700" cap="flat" cmpd="sng" algn="ctr">
-                      <a:solidFill>
-                        <a:schemeClr val="dk1"/>
-                      </a:solidFill>
-                      <a:prstDash val="solid"/>
-                      <a:round/>
-                      <a:headEnd type="none" w="sm" len="sm"/>
-                      <a:tailEnd type="none" w="sm" len="sm"/>
-                    </a:lnL>
-                    <a:lnR w="12700" cap="flat" cmpd="sng">
-                      <a:solidFill>
-                        <a:schemeClr val="dk1"/>
-                      </a:solidFill>
-                      <a:prstDash val="solid"/>
-                      <a:round/>
-                      <a:headEnd type="none" w="sm" len="sm"/>
-                      <a:tailEnd type="none" w="sm" len="sm"/>
-                    </a:lnR>
-                    <a:lnT w="12700" cap="flat" cmpd="sng">
-                      <a:solidFill>
-                        <a:schemeClr val="dk1"/>
-                      </a:solidFill>
-                      <a:prstDash val="solid"/>
-                      <a:round/>
-                      <a:headEnd type="none" w="sm" len="sm"/>
-                      <a:tailEnd type="none" w="sm" len="sm"/>
-                    </a:lnT>
-                    <a:lnB w="12700" cap="flat" cmpd="sng">
-                      <a:solidFill>
-                        <a:schemeClr val="dk1"/>
-                      </a:solidFill>
-                      <a:prstDash val="solid"/>
-                      <a:round/>
-                      <a:headEnd type="none" w="sm" len="sm"/>
-                      <a:tailEnd type="none" w="sm" len="sm"/>
-                    </a:lnB>
-                  </a:tcPr>
-                </a:tc>
-                <a:extLst>
-                  <a:ext uri="{0D108BD9-81ED-4DB2-BD59-A6C34878D82A}">
-                    <a16:rowId xmlns:a16="http://schemas.microsoft.com/office/drawing/2014/main" val="10002"/>
-                  </a:ext>
-                </a:extLst>
-              </a:tr>
-              <a:tr h="509675">
-                <a:tc>
-                  <a:txBody>
-                    <a:bodyPr/>
-                    <a:lstStyle/>
-                    <a:p>
-                      <a:pPr marL="0" marR="0" lvl="0" indent="0" algn="ctr" rtl="0">
-                        <a:lnSpc>
-                          <a:spcPct val="100000"/>
-                        </a:lnSpc>
-                        <a:spcBef>
-                          <a:spcPts val="0"/>
-                        </a:spcBef>
-                        <a:spcAft>
-                          <a:spcPts val="0"/>
-                        </a:spcAft>
-                        <a:buClr>
-                          <a:srgbClr val="000000"/>
-                        </a:buClr>
-                        <a:buSzPts val="2400"/>
-                        <a:buFont typeface="Arial"/>
-                        <a:buNone/>
-                      </a:pPr>
-                      <a:r>
-                        <a:rPr lang="en-US" sz="2400" u="none" strike="noStrike" cap="none">
-                          <a:solidFill>
-                            <a:srgbClr val="002060"/>
-                          </a:solidFill>
-                        </a:rPr>
-                        <a:t>12</a:t>
-                      </a:r>
-                      <a:endParaRPr sz="1400" u="none" strike="noStrike" cap="none"/>
-                    </a:p>
-                  </a:txBody>
-                  <a:tcPr marL="91450" marR="91450" marT="45725" marB="45725" anchor="ctr">
-                    <a:lnL w="12700" cap="flat" cmpd="sng">
-                      <a:solidFill>
-                        <a:schemeClr val="dk1"/>
-                      </a:solidFill>
-                      <a:prstDash val="solid"/>
-                      <a:round/>
-                      <a:headEnd type="none" w="sm" len="sm"/>
-                      <a:tailEnd type="none" w="sm" len="sm"/>
-                    </a:lnL>
-                    <a:lnR w="12700" cap="flat" cmpd="sng">
-                      <a:solidFill>
-                        <a:schemeClr val="dk1"/>
-                      </a:solidFill>
-                      <a:prstDash val="solid"/>
-                      <a:round/>
-                      <a:headEnd type="none" w="sm" len="sm"/>
-                      <a:tailEnd type="none" w="sm" len="sm"/>
-                    </a:lnR>
-                    <a:lnT w="12700" cap="flat" cmpd="sng">
-                      <a:solidFill>
-                        <a:schemeClr val="dk1"/>
-                      </a:solidFill>
-                      <a:prstDash val="solid"/>
-                      <a:round/>
-                      <a:headEnd type="none" w="sm" len="sm"/>
-                      <a:tailEnd type="none" w="sm" len="sm"/>
-                    </a:lnT>
-                    <a:lnB w="12700" cap="flat" cmpd="sng">
-                      <a:solidFill>
-                        <a:schemeClr val="dk1"/>
-                      </a:solidFill>
-                      <a:prstDash val="solid"/>
-                      <a:round/>
-                      <a:headEnd type="none" w="sm" len="sm"/>
-                      <a:tailEnd type="none" w="sm" len="sm"/>
-                    </a:lnB>
-                  </a:tcPr>
-                </a:tc>
-                <a:tc>
-                  <a:txBody>
-                    <a:bodyPr/>
-                    <a:lstStyle/>
-                    <a:p>
-                      <a:pPr marL="0" marR="0" lvl="0" indent="0" algn="ctr" rtl="0">
-                        <a:lnSpc>
-                          <a:spcPct val="100000"/>
-                        </a:lnSpc>
-                        <a:spcBef>
-                          <a:spcPts val="0"/>
-                        </a:spcBef>
-                        <a:spcAft>
-                          <a:spcPts val="0"/>
-                        </a:spcAft>
-                        <a:buClr>
-                          <a:srgbClr val="000000"/>
-                        </a:buClr>
-                        <a:buSzPts val="2400"/>
-                        <a:buFont typeface="Arial"/>
-                        <a:buNone/>
-                      </a:pPr>
-                      <a:endParaRPr sz="1400" u="none" strike="noStrike" cap="none"/>
-                    </a:p>
-                  </a:txBody>
-                  <a:tcPr marL="91450" marR="91450" marT="45725" marB="45725" anchor="ctr">
-                    <a:lnL w="12700" cap="flat" cmpd="sng">
-                      <a:solidFill>
-                        <a:schemeClr val="dk1"/>
-                      </a:solidFill>
-                      <a:prstDash val="solid"/>
-                      <a:round/>
-                      <a:headEnd type="none" w="sm" len="sm"/>
-                      <a:tailEnd type="none" w="sm" len="sm"/>
-                    </a:lnL>
-                    <a:lnR w="12700" cap="flat" cmpd="sng" algn="ctr">
-                      <a:solidFill>
-                        <a:schemeClr val="dk1"/>
-                      </a:solidFill>
-                      <a:prstDash val="solid"/>
-                      <a:round/>
-                      <a:headEnd type="none" w="sm" len="sm"/>
-                      <a:tailEnd type="none" w="sm" len="sm"/>
-                    </a:lnR>
-                    <a:lnT w="12700" cap="flat" cmpd="sng">
+                    <a:lnT w="12700" cap="flat" cmpd="sng" algn="ctr">
                       <a:solidFill>
                         <a:schemeClr val="dk1"/>
                       </a:solidFill>
@@ -34751,7 +34290,7 @@
                       <a:headEnd type="none" w="sm" len="sm"/>
                       <a:tailEnd type="none" w="sm" len="sm"/>
                     </a:lnR>
-                    <a:lnT w="12700" cap="flat" cmpd="sng">
+                    <a:lnT w="12700" cap="flat" cmpd="sng" algn="ctr">
                       <a:solidFill>
                         <a:schemeClr val="dk1"/>
                       </a:solidFill>
@@ -34806,7 +34345,7 @@
                             <a:srgbClr val="002060"/>
                           </a:solidFill>
                         </a:rPr>
-                        <a:t>13</a:t>
+                        <a:t>11</a:t>
                       </a:r>
                       <a:endParaRPr sz="1400" u="none" strike="noStrike" cap="none"/>
                     </a:p>
@@ -35038,7 +34577,7 @@
                             <a:srgbClr val="002060"/>
                           </a:solidFill>
                         </a:rPr>
-                        <a:t>14</a:t>
+                        <a:t>12</a:t>
                       </a:r>
                       <a:endParaRPr sz="1400" u="none" strike="noStrike" cap="none"/>
                     </a:p>
@@ -35179,7 +34718,7 @@
                           <a:latin typeface="+mj-lt"/>
                           <a:cs typeface="Times New Roman" panose="02020603050405020304" pitchFamily="18" charset="0"/>
                         </a:rPr>
-                        <a:t>Case Study – 03: Classification Models</a:t>
+                        <a:t>Case Study – 03: Supervised Models</a:t>
                       </a:r>
                       <a:endParaRPr kumimoji="0" lang="en-US" altLang="id-ID" sz="1800" b="1" i="0" u="none" strike="noStrike" cap="none" normalizeH="0" baseline="0" dirty="0">
                         <a:ln>
@@ -35263,12 +34802,12 @@
                         <a:buNone/>
                       </a:pPr>
                       <a:r>
-                        <a:rPr lang="en-US" sz="2400" u="none" strike="noStrike" cap="none" dirty="0">
+                        <a:rPr lang="en-US" sz="2400" u="none" strike="noStrike" cap="none">
                           <a:solidFill>
                             <a:srgbClr val="002060"/>
                           </a:solidFill>
                         </a:rPr>
-                        <a:t>15</a:t>
+                        <a:t>13</a:t>
                       </a:r>
                       <a:endParaRPr sz="1400" u="none" strike="noStrike" cap="none" dirty="0"/>
                     </a:p>
@@ -35493,12 +35032,12 @@
                         <a:buNone/>
                       </a:pPr>
                       <a:r>
-                        <a:rPr lang="en-US" sz="2400" u="none" strike="noStrike" cap="none" dirty="0">
+                        <a:rPr lang="en-US" sz="2400" u="none" strike="noStrike" cap="none">
                           <a:solidFill>
                             <a:srgbClr val="002060"/>
                           </a:solidFill>
                         </a:rPr>
-                        <a:t>16</a:t>
+                        <a:t>14</a:t>
                       </a:r>
                       <a:endParaRPr sz="1400" u="none" strike="noStrike" cap="none" dirty="0"/>
                     </a:p>
@@ -35639,7 +35178,7 @@
                           <a:latin typeface="+mj-lt"/>
                           <a:cs typeface="Times New Roman" panose="02020603050405020304" pitchFamily="18" charset="0"/>
                         </a:rPr>
-                        <a:t>Introduction to Social Media Analytics</a:t>
+                        <a:t>Introduction to Social Media &amp; Network Analytics</a:t>
                       </a:r>
                       <a:endParaRPr kumimoji="0" lang="en-US" altLang="id-ID" sz="1800" b="0" i="0" u="none" strike="noStrike" cap="none" normalizeH="0" baseline="0" dirty="0">
                         <a:ln>
@@ -35723,12 +35262,12 @@
                         <a:buNone/>
                       </a:pPr>
                       <a:r>
-                        <a:rPr lang="en-US" sz="2400" u="none" strike="noStrike" cap="none" dirty="0">
+                        <a:rPr lang="en-US" sz="2400" u="none" strike="noStrike" cap="none">
                           <a:solidFill>
                             <a:srgbClr val="002060"/>
                           </a:solidFill>
                         </a:rPr>
-                        <a:t>17</a:t>
+                        <a:t>15</a:t>
                       </a:r>
                       <a:endParaRPr sz="1400" u="none" strike="noStrike" cap="none" dirty="0"/>
                     </a:p>
@@ -35938,12 +35477,12 @@
                         <a:buNone/>
                       </a:pPr>
                       <a:r>
-                        <a:rPr lang="en-US" sz="2400" u="none" strike="noStrike" cap="none" dirty="0">
+                        <a:rPr lang="en-US" sz="2400" u="none" strike="noStrike" cap="none">
                           <a:solidFill>
                             <a:srgbClr val="002060"/>
                           </a:solidFill>
                         </a:rPr>
-                        <a:t>18</a:t>
+                        <a:t>16</a:t>
                       </a:r>
                       <a:endParaRPr sz="1400" u="none" strike="noStrike" cap="none" dirty="0"/>
                     </a:p>
@@ -36139,72 +35678,6 @@
           </a:graphicData>
         </a:graphic>
       </p:graphicFrame>
-      <p:sp>
-        <p:nvSpPr>
-          <p:cNvPr id="286" name="Google Shape;286;p62"/>
-          <p:cNvSpPr txBox="1"/>
-          <p:nvPr/>
-        </p:nvSpPr>
-        <p:spPr>
-          <a:xfrm>
-            <a:off x="253893" y="6484132"/>
-            <a:ext cx="5049780" cy="276999"/>
-          </a:xfrm>
-          <a:prstGeom prst="rect">
-            <a:avLst/>
-          </a:prstGeom>
-          <a:noFill/>
-          <a:ln>
-            <a:noFill/>
-          </a:ln>
-        </p:spPr>
-        <p:txBody>
-          <a:bodyPr spcFirstLastPara="1" wrap="square" lIns="91425" tIns="45700" rIns="91425" bIns="45700" anchor="t" anchorCtr="0">
-            <a:spAutoFit/>
-          </a:bodyPr>
-          <a:lstStyle/>
-          <a:p>
-            <a:pPr marL="0" marR="0" lvl="0" indent="0" algn="l" rtl="0">
-              <a:lnSpc>
-                <a:spcPct val="100000"/>
-              </a:lnSpc>
-              <a:spcBef>
-                <a:spcPts val="0"/>
-              </a:spcBef>
-              <a:spcAft>
-                <a:spcPts val="0"/>
-              </a:spcAft>
-              <a:buClr>
-                <a:srgbClr val="000000"/>
-              </a:buClr>
-              <a:buSzPts val="1200"/>
-              <a:buFont typeface="Arial"/>
-              <a:buNone/>
-            </a:pPr>
-            <a:r>
-              <a:rPr lang="en-US" sz="1200" b="0" i="0" u="none" strike="noStrike" cap="none">
-                <a:solidFill>
-                  <a:srgbClr val="002060"/>
-                </a:solidFill>
-                <a:latin typeface="Montserrat"/>
-                <a:ea typeface="Montserrat"/>
-                <a:cs typeface="Montserrat"/>
-                <a:sym typeface="Montserrat"/>
-              </a:rPr>
-              <a:t>Uploading of Values ​​to SIAK-NG: January 10, 2021 at 16.00</a:t>
-            </a:r>
-            <a:endParaRPr sz="1400" b="0" i="0" u="none" strike="noStrike" cap="none">
-              <a:solidFill>
-                <a:srgbClr val="000000"/>
-              </a:solidFill>
-              <a:latin typeface="Arial"/>
-              <a:ea typeface="Arial"/>
-              <a:cs typeface="Arial"/>
-              <a:sym typeface="Arial"/>
-            </a:endParaRPr>
-          </a:p>
-        </p:txBody>
-      </p:sp>
     </p:spTree>
   </p:cSld>
   <p:clrMapOvr>
@@ -36216,7 +35689,7 @@
         <p:fade/>
       </p:transition>
     </mc:Choice>
-    <mc:Fallback xmlns:ahyp="http://schemas.microsoft.com/office/drawing/2018/hyperlinkcolor" xmlns:p15="http://schemas.microsoft.com/office/powerpoint/2012/main" xmlns:com="http://schemas.openxmlformats.org/drawingml/2006/compatibility" xmlns:pvml="urn:schemas-microsoft-com:office:powerpoint" xmlns:v="urn:schemas-microsoft-com:vml" xmlns:o="urn:schemas-microsoft-com:office:office" xmlns:dgm="http://schemas.openxmlformats.org/drawingml/2006/diagram" xmlns:c="http://schemas.openxmlformats.org/drawingml/2006/chart" xmlns:mv="urn:schemas-microsoft-com:mac:vml" xmlns="">
+    <mc:Fallback xmlns="" xmlns:mv="urn:schemas-microsoft-com:mac:vml" xmlns:c="http://schemas.openxmlformats.org/drawingml/2006/chart" xmlns:dgm="http://schemas.openxmlformats.org/drawingml/2006/diagram" xmlns:o="urn:schemas-microsoft-com:office:office" xmlns:v="urn:schemas-microsoft-com:vml" xmlns:pvml="urn:schemas-microsoft-com:office:powerpoint" xmlns:com="http://schemas.openxmlformats.org/drawingml/2006/compatibility" xmlns:p15="http://schemas.microsoft.com/office/powerpoint/2012/main" xmlns:ahyp="http://schemas.microsoft.com/office/drawing/2018/hyperlinkcolor">
       <p:transition spd="slow">
         <p:fade/>
       </p:transition>
@@ -37769,7 +37242,7 @@
         <p:fade/>
       </p:transition>
     </mc:Choice>
-    <mc:Fallback xmlns:ahyp="http://schemas.microsoft.com/office/drawing/2018/hyperlinkcolor" xmlns:p15="http://schemas.microsoft.com/office/powerpoint/2012/main" xmlns:com="http://schemas.openxmlformats.org/drawingml/2006/compatibility" xmlns:pvml="urn:schemas-microsoft-com:office:powerpoint" xmlns:v="urn:schemas-microsoft-com:vml" xmlns:o="urn:schemas-microsoft-com:office:office" xmlns:dgm="http://schemas.openxmlformats.org/drawingml/2006/diagram" xmlns:c="http://schemas.openxmlformats.org/drawingml/2006/chart" xmlns:mv="urn:schemas-microsoft-com:mac:vml" xmlns="">
+    <mc:Fallback xmlns="" xmlns:mv="urn:schemas-microsoft-com:mac:vml" xmlns:c="http://schemas.openxmlformats.org/drawingml/2006/chart" xmlns:dgm="http://schemas.openxmlformats.org/drawingml/2006/diagram" xmlns:o="urn:schemas-microsoft-com:office:office" xmlns:v="urn:schemas-microsoft-com:vml" xmlns:pvml="urn:schemas-microsoft-com:office:powerpoint" xmlns:com="http://schemas.openxmlformats.org/drawingml/2006/compatibility" xmlns:p15="http://schemas.microsoft.com/office/powerpoint/2012/main" xmlns:ahyp="http://schemas.microsoft.com/office/drawing/2018/hyperlinkcolor">
       <p:transition spd="slow">
         <p:fade/>
       </p:transition>
@@ -38062,7 +37535,7 @@
         <p:fade/>
       </p:transition>
     </mc:Choice>
-    <mc:Fallback xmlns:ahyp="http://schemas.microsoft.com/office/drawing/2018/hyperlinkcolor" xmlns:p15="http://schemas.microsoft.com/office/powerpoint/2012/main" xmlns:com="http://schemas.openxmlformats.org/drawingml/2006/compatibility" xmlns:pvml="urn:schemas-microsoft-com:office:powerpoint" xmlns:v="urn:schemas-microsoft-com:vml" xmlns:o="urn:schemas-microsoft-com:office:office" xmlns:dgm="http://schemas.openxmlformats.org/drawingml/2006/diagram" xmlns:c="http://schemas.openxmlformats.org/drawingml/2006/chart" xmlns:mv="urn:schemas-microsoft-com:mac:vml" xmlns="">
+    <mc:Fallback xmlns="" xmlns:mv="urn:schemas-microsoft-com:mac:vml" xmlns:c="http://schemas.openxmlformats.org/drawingml/2006/chart" xmlns:dgm="http://schemas.openxmlformats.org/drawingml/2006/diagram" xmlns:o="urn:schemas-microsoft-com:office:office" xmlns:v="urn:schemas-microsoft-com:vml" xmlns:pvml="urn:schemas-microsoft-com:office:powerpoint" xmlns:com="http://schemas.openxmlformats.org/drawingml/2006/compatibility" xmlns:p15="http://schemas.microsoft.com/office/powerpoint/2012/main" xmlns:ahyp="http://schemas.microsoft.com/office/drawing/2018/hyperlinkcolor">
       <p:transition spd="slow">
         <p:fade/>
       </p:transition>
@@ -39217,7 +38690,7 @@
         <p:fade/>
       </p:transition>
     </mc:Choice>
-    <mc:Fallback xmlns:ahyp="http://schemas.microsoft.com/office/drawing/2018/hyperlinkcolor" xmlns:p15="http://schemas.microsoft.com/office/powerpoint/2012/main" xmlns:com="http://schemas.openxmlformats.org/drawingml/2006/compatibility" xmlns:pvml="urn:schemas-microsoft-com:office:powerpoint" xmlns:v="urn:schemas-microsoft-com:vml" xmlns:o="urn:schemas-microsoft-com:office:office" xmlns:dgm="http://schemas.openxmlformats.org/drawingml/2006/diagram" xmlns:c="http://schemas.openxmlformats.org/drawingml/2006/chart" xmlns:mv="urn:schemas-microsoft-com:mac:vml" xmlns="">
+    <mc:Fallback xmlns="" xmlns:mv="urn:schemas-microsoft-com:mac:vml" xmlns:c="http://schemas.openxmlformats.org/drawingml/2006/chart" xmlns:dgm="http://schemas.openxmlformats.org/drawingml/2006/diagram" xmlns:o="urn:schemas-microsoft-com:office:office" xmlns:v="urn:schemas-microsoft-com:vml" xmlns:pvml="urn:schemas-microsoft-com:office:powerpoint" xmlns:com="http://schemas.openxmlformats.org/drawingml/2006/compatibility" xmlns:p15="http://schemas.microsoft.com/office/powerpoint/2012/main" xmlns:ahyp="http://schemas.microsoft.com/office/drawing/2018/hyperlinkcolor">
       <p:transition spd="slow">
         <p:fade/>
       </p:transition>
@@ -39903,7 +39376,7 @@
         <p:fade/>
       </p:transition>
     </mc:Choice>
-    <mc:Fallback xmlns:ahyp="http://schemas.microsoft.com/office/drawing/2018/hyperlinkcolor" xmlns:p15="http://schemas.microsoft.com/office/powerpoint/2012/main" xmlns:com="http://schemas.openxmlformats.org/drawingml/2006/compatibility" xmlns:pvml="urn:schemas-microsoft-com:office:powerpoint" xmlns:v="urn:schemas-microsoft-com:vml" xmlns:o="urn:schemas-microsoft-com:office:office" xmlns:dgm="http://schemas.openxmlformats.org/drawingml/2006/diagram" xmlns:c="http://schemas.openxmlformats.org/drawingml/2006/chart" xmlns:mv="urn:schemas-microsoft-com:mac:vml" xmlns="">
+    <mc:Fallback xmlns="" xmlns:mv="urn:schemas-microsoft-com:mac:vml" xmlns:c="http://schemas.openxmlformats.org/drawingml/2006/chart" xmlns:dgm="http://schemas.openxmlformats.org/drawingml/2006/diagram" xmlns:o="urn:schemas-microsoft-com:office:office" xmlns:v="urn:schemas-microsoft-com:vml" xmlns:pvml="urn:schemas-microsoft-com:office:powerpoint" xmlns:com="http://schemas.openxmlformats.org/drawingml/2006/compatibility" xmlns:p15="http://schemas.microsoft.com/office/powerpoint/2012/main" xmlns:ahyp="http://schemas.microsoft.com/office/drawing/2018/hyperlinkcolor">
       <p:transition spd="slow">
         <p:fade/>
       </p:transition>
@@ -40875,7 +40348,7 @@
         <p:fade/>
       </p:transition>
     </mc:Choice>
-    <mc:Fallback xmlns:ahyp="http://schemas.microsoft.com/office/drawing/2018/hyperlinkcolor" xmlns:p15="http://schemas.microsoft.com/office/powerpoint/2012/main" xmlns:com="http://schemas.openxmlformats.org/drawingml/2006/compatibility" xmlns:pvml="urn:schemas-microsoft-com:office:powerpoint" xmlns:v="urn:schemas-microsoft-com:vml" xmlns:o="urn:schemas-microsoft-com:office:office" xmlns:dgm="http://schemas.openxmlformats.org/drawingml/2006/diagram" xmlns:c="http://schemas.openxmlformats.org/drawingml/2006/chart" xmlns:mv="urn:schemas-microsoft-com:mac:vml" xmlns="">
+    <mc:Fallback xmlns="" xmlns:mv="urn:schemas-microsoft-com:mac:vml" xmlns:c="http://schemas.openxmlformats.org/drawingml/2006/chart" xmlns:dgm="http://schemas.openxmlformats.org/drawingml/2006/diagram" xmlns:o="urn:schemas-microsoft-com:office:office" xmlns:v="urn:schemas-microsoft-com:vml" xmlns:pvml="urn:schemas-microsoft-com:office:powerpoint" xmlns:com="http://schemas.openxmlformats.org/drawingml/2006/compatibility" xmlns:p15="http://schemas.microsoft.com/office/powerpoint/2012/main" xmlns:ahyp="http://schemas.microsoft.com/office/drawing/2018/hyperlinkcolor">
       <p:transition spd="slow">
         <p:fade/>
       </p:transition>
@@ -48477,7 +47950,7 @@
         <p:fade/>
       </p:transition>
     </mc:Choice>
-    <mc:Fallback xmlns="" xmlns:mv="urn:schemas-microsoft-com:mac:vml" xmlns:c="http://schemas.openxmlformats.org/drawingml/2006/chart" xmlns:dgm="http://schemas.openxmlformats.org/drawingml/2006/diagram" xmlns:o="urn:schemas-microsoft-com:office:office" xmlns:v="urn:schemas-microsoft-com:vml" xmlns:pvml="urn:schemas-microsoft-com:office:powerpoint" xmlns:com="http://schemas.openxmlformats.org/drawingml/2006/compatibility" xmlns:p15="http://schemas.microsoft.com/office/powerpoint/2012/main" xmlns:ahyp="http://schemas.microsoft.com/office/drawing/2018/hyperlinkcolor">
+    <mc:Fallback xmlns:ahyp="http://schemas.microsoft.com/office/drawing/2018/hyperlinkcolor" xmlns:p15="http://schemas.microsoft.com/office/powerpoint/2012/main" xmlns:com="http://schemas.openxmlformats.org/drawingml/2006/compatibility" xmlns:pvml="urn:schemas-microsoft-com:office:powerpoint" xmlns:v="urn:schemas-microsoft-com:vml" xmlns:o="urn:schemas-microsoft-com:office:office" xmlns:dgm="http://schemas.openxmlformats.org/drawingml/2006/diagram" xmlns:c="http://schemas.openxmlformats.org/drawingml/2006/chart" xmlns:mv="urn:schemas-microsoft-com:mac:vml" xmlns="">
       <p:transition spd="slow">
         <p:fade/>
       </p:transition>
@@ -48642,7 +48115,7 @@
         <p:fade/>
       </p:transition>
     </mc:Choice>
-    <mc:Fallback xmlns:ahyp="http://schemas.microsoft.com/office/drawing/2018/hyperlinkcolor" xmlns:p15="http://schemas.microsoft.com/office/powerpoint/2012/main" xmlns:com="http://schemas.openxmlformats.org/drawingml/2006/compatibility" xmlns:pvml="urn:schemas-microsoft-com:office:powerpoint" xmlns:v="urn:schemas-microsoft-com:vml" xmlns:o="urn:schemas-microsoft-com:office:office" xmlns:dgm="http://schemas.openxmlformats.org/drawingml/2006/diagram" xmlns:c="http://schemas.openxmlformats.org/drawingml/2006/chart" xmlns:mv="urn:schemas-microsoft-com:mac:vml" xmlns="">
+    <mc:Fallback xmlns="" xmlns:mv="urn:schemas-microsoft-com:mac:vml" xmlns:c="http://schemas.openxmlformats.org/drawingml/2006/chart" xmlns:dgm="http://schemas.openxmlformats.org/drawingml/2006/diagram" xmlns:o="urn:schemas-microsoft-com:office:office" xmlns:v="urn:schemas-microsoft-com:vml" xmlns:pvml="urn:schemas-microsoft-com:office:powerpoint" xmlns:com="http://schemas.openxmlformats.org/drawingml/2006/compatibility" xmlns:p15="http://schemas.microsoft.com/office/powerpoint/2012/main" xmlns:ahyp="http://schemas.microsoft.com/office/drawing/2018/hyperlinkcolor">
       <p:transition spd="slow">
         <p:fade/>
       </p:transition>
@@ -49006,7 +48479,7 @@
         <p:fade/>
       </p:transition>
     </mc:Choice>
-    <mc:Fallback xmlns:ahyp="http://schemas.microsoft.com/office/drawing/2018/hyperlinkcolor" xmlns:p15="http://schemas.microsoft.com/office/powerpoint/2012/main" xmlns:com="http://schemas.openxmlformats.org/drawingml/2006/compatibility" xmlns:pvml="urn:schemas-microsoft-com:office:powerpoint" xmlns:v="urn:schemas-microsoft-com:vml" xmlns:o="urn:schemas-microsoft-com:office:office" xmlns:dgm="http://schemas.openxmlformats.org/drawingml/2006/diagram" xmlns:c="http://schemas.openxmlformats.org/drawingml/2006/chart" xmlns:mv="urn:schemas-microsoft-com:mac:vml" xmlns="">
+    <mc:Fallback xmlns="" xmlns:mv="urn:schemas-microsoft-com:mac:vml" xmlns:c="http://schemas.openxmlformats.org/drawingml/2006/chart" xmlns:dgm="http://schemas.openxmlformats.org/drawingml/2006/diagram" xmlns:o="urn:schemas-microsoft-com:office:office" xmlns:v="urn:schemas-microsoft-com:vml" xmlns:pvml="urn:schemas-microsoft-com:office:powerpoint" xmlns:com="http://schemas.openxmlformats.org/drawingml/2006/compatibility" xmlns:p15="http://schemas.microsoft.com/office/powerpoint/2012/main" xmlns:ahyp="http://schemas.microsoft.com/office/drawing/2018/hyperlinkcolor">
       <p:transition spd="slow">
         <p:fade/>
       </p:transition>
@@ -50333,7 +49806,7 @@
         <p:fade/>
       </p:transition>
     </mc:Choice>
-    <mc:Fallback xmlns:ahyp="http://schemas.microsoft.com/office/drawing/2018/hyperlinkcolor" xmlns:p15="http://schemas.microsoft.com/office/powerpoint/2012/main" xmlns:com="http://schemas.openxmlformats.org/drawingml/2006/compatibility" xmlns:pvml="urn:schemas-microsoft-com:office:powerpoint" xmlns:v="urn:schemas-microsoft-com:vml" xmlns:o="urn:schemas-microsoft-com:office:office" xmlns:dgm="http://schemas.openxmlformats.org/drawingml/2006/diagram" xmlns:c="http://schemas.openxmlformats.org/drawingml/2006/chart" xmlns:mv="urn:schemas-microsoft-com:mac:vml" xmlns="">
+    <mc:Fallback xmlns="" xmlns:mv="urn:schemas-microsoft-com:mac:vml" xmlns:c="http://schemas.openxmlformats.org/drawingml/2006/chart" xmlns:dgm="http://schemas.openxmlformats.org/drawingml/2006/diagram" xmlns:o="urn:schemas-microsoft-com:office:office" xmlns:v="urn:schemas-microsoft-com:vml" xmlns:pvml="urn:schemas-microsoft-com:office:powerpoint" xmlns:com="http://schemas.openxmlformats.org/drawingml/2006/compatibility" xmlns:p15="http://schemas.microsoft.com/office/powerpoint/2012/main" xmlns:ahyp="http://schemas.microsoft.com/office/drawing/2018/hyperlinkcolor">
       <p:transition spd="slow">
         <p:fade/>
       </p:transition>
@@ -51036,7 +50509,7 @@
         <p:fade/>
       </p:transition>
     </mc:Choice>
-    <mc:Fallback xmlns:ahyp="http://schemas.microsoft.com/office/drawing/2018/hyperlinkcolor" xmlns:p15="http://schemas.microsoft.com/office/powerpoint/2012/main" xmlns:com="http://schemas.openxmlformats.org/drawingml/2006/compatibility" xmlns:pvml="urn:schemas-microsoft-com:office:powerpoint" xmlns:v="urn:schemas-microsoft-com:vml" xmlns:o="urn:schemas-microsoft-com:office:office" xmlns:dgm="http://schemas.openxmlformats.org/drawingml/2006/diagram" xmlns:c="http://schemas.openxmlformats.org/drawingml/2006/chart" xmlns:mv="urn:schemas-microsoft-com:mac:vml" xmlns="">
+    <mc:Fallback xmlns="" xmlns:mv="urn:schemas-microsoft-com:mac:vml" xmlns:c="http://schemas.openxmlformats.org/drawingml/2006/chart" xmlns:dgm="http://schemas.openxmlformats.org/drawingml/2006/diagram" xmlns:o="urn:schemas-microsoft-com:office:office" xmlns:v="urn:schemas-microsoft-com:vml" xmlns:pvml="urn:schemas-microsoft-com:office:powerpoint" xmlns:com="http://schemas.openxmlformats.org/drawingml/2006/compatibility" xmlns:p15="http://schemas.microsoft.com/office/powerpoint/2012/main" xmlns:ahyp="http://schemas.microsoft.com/office/drawing/2018/hyperlinkcolor">
       <p:transition spd="slow">
         <p:fade/>
       </p:transition>
@@ -51259,7 +50732,7 @@
         <p:fade/>
       </p:transition>
     </mc:Choice>
-    <mc:Fallback xmlns:ahyp="http://schemas.microsoft.com/office/drawing/2018/hyperlinkcolor" xmlns:p15="http://schemas.microsoft.com/office/powerpoint/2012/main" xmlns:com="http://schemas.openxmlformats.org/drawingml/2006/compatibility" xmlns:pvml="urn:schemas-microsoft-com:office:powerpoint" xmlns:v="urn:schemas-microsoft-com:vml" xmlns:o="urn:schemas-microsoft-com:office:office" xmlns:dgm="http://schemas.openxmlformats.org/drawingml/2006/diagram" xmlns:c="http://schemas.openxmlformats.org/drawingml/2006/chart" xmlns:mv="urn:schemas-microsoft-com:mac:vml" xmlns="">
+    <mc:Fallback xmlns="" xmlns:mv="urn:schemas-microsoft-com:mac:vml" xmlns:c="http://schemas.openxmlformats.org/drawingml/2006/chart" xmlns:dgm="http://schemas.openxmlformats.org/drawingml/2006/diagram" xmlns:o="urn:schemas-microsoft-com:office:office" xmlns:v="urn:schemas-microsoft-com:vml" xmlns:pvml="urn:schemas-microsoft-com:office:powerpoint" xmlns:com="http://schemas.openxmlformats.org/drawingml/2006/compatibility" xmlns:p15="http://schemas.microsoft.com/office/powerpoint/2012/main" xmlns:ahyp="http://schemas.microsoft.com/office/drawing/2018/hyperlinkcolor">
       <p:transition spd="slow">
         <p:fade/>
       </p:transition>

</xml_diff>

<commit_message>
update syllaby & folders
</commit_message>
<xml_diff>
--- a/Data Mining 00 - Study Contract - odd Sem 2024.pptx
+++ b/Data Mining 00 - Study Contract - odd Sem 2024.pptx
@@ -275,7 +275,7 @@
       </p15:sldGuideLst>
     </p:ext>
     <p:ext uri="http://customooxmlschemas.google.com/">
-      <go:slidesCustomData xmlns="" xmlns:mc="http://schemas.openxmlformats.org/markup-compatibility/2006" xmlns:mv="urn:schemas-microsoft-com:mac:vml" xmlns:c="http://schemas.openxmlformats.org/drawingml/2006/chart" xmlns:dgm="http://schemas.openxmlformats.org/drawingml/2006/diagram" xmlns:o="urn:schemas-microsoft-com:office:office" xmlns:v="urn:schemas-microsoft-com:vml" xmlns:pvml="urn:schemas-microsoft-com:office:powerpoint" xmlns:com="http://schemas.openxmlformats.org/drawingml/2006/compatibility" xmlns:p14="http://schemas.microsoft.com/office/powerpoint/2010/main" xmlns:p15="http://schemas.microsoft.com/office/powerpoint/2012/main" xmlns:ahyp="http://schemas.microsoft.com/office/drawing/2018/hyperlinkcolor" xmlns:go="http://customooxmlschemas.google.com/" r:id="rId38" roundtripDataSignature="AMtx7mg1xIdlU9iqJWCF4sosEKO5NfSY+w=="/>
+      <go:slidesCustomData xmlns:go="http://customooxmlschemas.google.com/" xmlns:ahyp="http://schemas.microsoft.com/office/drawing/2018/hyperlinkcolor" xmlns:p15="http://schemas.microsoft.com/office/powerpoint/2012/main" xmlns:p14="http://schemas.microsoft.com/office/powerpoint/2010/main" xmlns:com="http://schemas.openxmlformats.org/drawingml/2006/compatibility" xmlns:pvml="urn:schemas-microsoft-com:office:powerpoint" xmlns:v="urn:schemas-microsoft-com:vml" xmlns:o="urn:schemas-microsoft-com:office:office" xmlns:dgm="http://schemas.openxmlformats.org/drawingml/2006/diagram" xmlns:c="http://schemas.openxmlformats.org/drawingml/2006/chart" xmlns:mv="urn:schemas-microsoft-com:mac:vml" xmlns:mc="http://schemas.openxmlformats.org/markup-compatibility/2006" xmlns="" r:id="rId38" roundtripDataSignature="AMtx7mg1xIdlU9iqJWCF4sosEKO5NfSY+w=="/>
     </p:ext>
   </p:extLst>
 </p:presentation>
@@ -284,7 +284,7 @@
 <file path=ppt/revisionInfo.xml><?xml version="1.0" encoding="utf-8"?>
 <p1510:revInfo xmlns:a="http://schemas.openxmlformats.org/drawingml/2006/main" xmlns:r="http://schemas.openxmlformats.org/officeDocument/2006/relationships" xmlns:p1510="http://schemas.microsoft.com/office/powerpoint/2015/10/main">
   <p1510:revLst>
-    <p1510:client id="{B26CF93A-456C-464D-864A-510C2BBAE113}" v="81" dt="2024-09-05T01:06:27.555"/>
+    <p1510:client id="{C8BD5E8B-D07B-43FB-B46B-F410E3708F78}" v="8" dt="2024-09-17T07:00:08.461"/>
   </p1510:revLst>
 </p1510:revInfo>
 </file>
@@ -1401,6 +1401,45 @@
       </pc:sldMasterChg>
     </pc:docChg>
   </pc:docChgLst>
+  <pc:docChgLst>
+    <pc:chgData name="Taufik Edy Sutanto, M.Sc.Tech.,Ph.D" userId="012573cc-7230-4d80-9d32-62cda141001e" providerId="ADAL" clId="{C8BD5E8B-D07B-43FB-B46B-F410E3708F78}"/>
+    <pc:docChg chg="modSld">
+      <pc:chgData name="Taufik Edy Sutanto, M.Sc.Tech.,Ph.D" userId="012573cc-7230-4d80-9d32-62cda141001e" providerId="ADAL" clId="{C8BD5E8B-D07B-43FB-B46B-F410E3708F78}" dt="2024-09-17T07:00:08.461" v="38"/>
+      <pc:docMkLst>
+        <pc:docMk/>
+      </pc:docMkLst>
+      <pc:sldChg chg="modSp mod">
+        <pc:chgData name="Taufik Edy Sutanto, M.Sc.Tech.,Ph.D" userId="012573cc-7230-4d80-9d32-62cda141001e" providerId="ADAL" clId="{C8BD5E8B-D07B-43FB-B46B-F410E3708F78}" dt="2024-09-17T06:59:29.996" v="10"/>
+        <pc:sldMkLst>
+          <pc:docMk/>
+          <pc:sldMk cId="0" sldId="265"/>
+        </pc:sldMkLst>
+        <pc:graphicFrameChg chg="mod modGraphic">
+          <ac:chgData name="Taufik Edy Sutanto, M.Sc.Tech.,Ph.D" userId="012573cc-7230-4d80-9d32-62cda141001e" providerId="ADAL" clId="{C8BD5E8B-D07B-43FB-B46B-F410E3708F78}" dt="2024-09-17T06:59:29.996" v="10"/>
+          <ac:graphicFrameMkLst>
+            <pc:docMk/>
+            <pc:sldMk cId="0" sldId="265"/>
+            <ac:graphicFrameMk id="277" creationId="{00000000-0000-0000-0000-000000000000}"/>
+          </ac:graphicFrameMkLst>
+        </pc:graphicFrameChg>
+      </pc:sldChg>
+      <pc:sldChg chg="modSp mod">
+        <pc:chgData name="Taufik Edy Sutanto, M.Sc.Tech.,Ph.D" userId="012573cc-7230-4d80-9d32-62cda141001e" providerId="ADAL" clId="{C8BD5E8B-D07B-43FB-B46B-F410E3708F78}" dt="2024-09-17T07:00:08.461" v="38"/>
+        <pc:sldMkLst>
+          <pc:docMk/>
+          <pc:sldMk cId="0" sldId="266"/>
+        </pc:sldMkLst>
+        <pc:graphicFrameChg chg="mod modGraphic">
+          <ac:chgData name="Taufik Edy Sutanto, M.Sc.Tech.,Ph.D" userId="012573cc-7230-4d80-9d32-62cda141001e" providerId="ADAL" clId="{C8BD5E8B-D07B-43FB-B46B-F410E3708F78}" dt="2024-09-17T07:00:08.461" v="38"/>
+          <ac:graphicFrameMkLst>
+            <pc:docMk/>
+            <pc:sldMk cId="0" sldId="266"/>
+            <ac:graphicFrameMk id="285" creationId="{00000000-0000-0000-0000-000000000000}"/>
+          </ac:graphicFrameMkLst>
+        </pc:graphicFrameChg>
+      </pc:sldChg>
+    </pc:docChg>
+  </pc:docChgLst>
 </pc:chgInfo>
 </file>
 
@@ -7476,7 +7515,7 @@
         <p:fade/>
       </p:transition>
     </mc:Choice>
-    <mc:Fallback xmlns="" xmlns:mv="urn:schemas-microsoft-com:mac:vml" xmlns:c="http://schemas.openxmlformats.org/drawingml/2006/chart" xmlns:dgm="http://schemas.openxmlformats.org/drawingml/2006/diagram" xmlns:o="urn:schemas-microsoft-com:office:office" xmlns:v="urn:schemas-microsoft-com:vml" xmlns:pvml="urn:schemas-microsoft-com:office:powerpoint" xmlns:com="http://schemas.openxmlformats.org/drawingml/2006/compatibility" xmlns:p15="http://schemas.microsoft.com/office/powerpoint/2012/main" xmlns:ahyp="http://schemas.microsoft.com/office/drawing/2018/hyperlinkcolor">
+    <mc:Fallback xmlns:ahyp="http://schemas.microsoft.com/office/drawing/2018/hyperlinkcolor" xmlns:p15="http://schemas.microsoft.com/office/powerpoint/2012/main" xmlns:com="http://schemas.openxmlformats.org/drawingml/2006/compatibility" xmlns:pvml="urn:schemas-microsoft-com:office:powerpoint" xmlns:v="urn:schemas-microsoft-com:vml" xmlns:o="urn:schemas-microsoft-com:office:office" xmlns:dgm="http://schemas.openxmlformats.org/drawingml/2006/diagram" xmlns:c="http://schemas.openxmlformats.org/drawingml/2006/chart" xmlns:mv="urn:schemas-microsoft-com:mac:vml" xmlns="">
       <p:transition spd="slow">
         <p:fade/>
       </p:transition>
@@ -8465,7 +8504,7 @@
         <p:fade/>
       </p:transition>
     </mc:Choice>
-    <mc:Fallback xmlns="" xmlns:mv="urn:schemas-microsoft-com:mac:vml" xmlns:c="http://schemas.openxmlformats.org/drawingml/2006/chart" xmlns:dgm="http://schemas.openxmlformats.org/drawingml/2006/diagram" xmlns:o="urn:schemas-microsoft-com:office:office" xmlns:v="urn:schemas-microsoft-com:vml" xmlns:pvml="urn:schemas-microsoft-com:office:powerpoint" xmlns:com="http://schemas.openxmlformats.org/drawingml/2006/compatibility" xmlns:p15="http://schemas.microsoft.com/office/powerpoint/2012/main" xmlns:ahyp="http://schemas.microsoft.com/office/drawing/2018/hyperlinkcolor">
+    <mc:Fallback xmlns:ahyp="http://schemas.microsoft.com/office/drawing/2018/hyperlinkcolor" xmlns:p15="http://schemas.microsoft.com/office/powerpoint/2012/main" xmlns:com="http://schemas.openxmlformats.org/drawingml/2006/compatibility" xmlns:pvml="urn:schemas-microsoft-com:office:powerpoint" xmlns:v="urn:schemas-microsoft-com:vml" xmlns:o="urn:schemas-microsoft-com:office:office" xmlns:dgm="http://schemas.openxmlformats.org/drawingml/2006/diagram" xmlns:c="http://schemas.openxmlformats.org/drawingml/2006/chart" xmlns:mv="urn:schemas-microsoft-com:mac:vml" xmlns="">
       <p:transition spd="slow">
         <p:fade/>
       </p:transition>
@@ -9453,7 +9492,7 @@
         <p:fade/>
       </p:transition>
     </mc:Choice>
-    <mc:Fallback xmlns="" xmlns:mv="urn:schemas-microsoft-com:mac:vml" xmlns:c="http://schemas.openxmlformats.org/drawingml/2006/chart" xmlns:dgm="http://schemas.openxmlformats.org/drawingml/2006/diagram" xmlns:o="urn:schemas-microsoft-com:office:office" xmlns:v="urn:schemas-microsoft-com:vml" xmlns:pvml="urn:schemas-microsoft-com:office:powerpoint" xmlns:com="http://schemas.openxmlformats.org/drawingml/2006/compatibility" xmlns:p15="http://schemas.microsoft.com/office/powerpoint/2012/main" xmlns:ahyp="http://schemas.microsoft.com/office/drawing/2018/hyperlinkcolor">
+    <mc:Fallback xmlns:ahyp="http://schemas.microsoft.com/office/drawing/2018/hyperlinkcolor" xmlns:p15="http://schemas.microsoft.com/office/powerpoint/2012/main" xmlns:com="http://schemas.openxmlformats.org/drawingml/2006/compatibility" xmlns:pvml="urn:schemas-microsoft-com:office:powerpoint" xmlns:v="urn:schemas-microsoft-com:vml" xmlns:o="urn:schemas-microsoft-com:office:office" xmlns:dgm="http://schemas.openxmlformats.org/drawingml/2006/diagram" xmlns:c="http://schemas.openxmlformats.org/drawingml/2006/chart" xmlns:mv="urn:schemas-microsoft-com:mac:vml" xmlns="">
       <p:transition spd="slow">
         <p:fade/>
       </p:transition>
@@ -10478,7 +10517,7 @@
         <p:fade/>
       </p:transition>
     </mc:Choice>
-    <mc:Fallback xmlns="" xmlns:mv="urn:schemas-microsoft-com:mac:vml" xmlns:c="http://schemas.openxmlformats.org/drawingml/2006/chart" xmlns:dgm="http://schemas.openxmlformats.org/drawingml/2006/diagram" xmlns:o="urn:schemas-microsoft-com:office:office" xmlns:v="urn:schemas-microsoft-com:vml" xmlns:pvml="urn:schemas-microsoft-com:office:powerpoint" xmlns:com="http://schemas.openxmlformats.org/drawingml/2006/compatibility" xmlns:p15="http://schemas.microsoft.com/office/powerpoint/2012/main" xmlns:ahyp="http://schemas.microsoft.com/office/drawing/2018/hyperlinkcolor">
+    <mc:Fallback xmlns:ahyp="http://schemas.microsoft.com/office/drawing/2018/hyperlinkcolor" xmlns:p15="http://schemas.microsoft.com/office/powerpoint/2012/main" xmlns:com="http://schemas.openxmlformats.org/drawingml/2006/compatibility" xmlns:pvml="urn:schemas-microsoft-com:office:powerpoint" xmlns:v="urn:schemas-microsoft-com:vml" xmlns:o="urn:schemas-microsoft-com:office:office" xmlns:dgm="http://schemas.openxmlformats.org/drawingml/2006/diagram" xmlns:c="http://schemas.openxmlformats.org/drawingml/2006/chart" xmlns:mv="urn:schemas-microsoft-com:mac:vml" xmlns="">
       <p:transition spd="slow">
         <p:fade/>
       </p:transition>
@@ -11653,7 +11692,7 @@
         <p:fade/>
       </p:transition>
     </mc:Choice>
-    <mc:Fallback xmlns="" xmlns:mv="urn:schemas-microsoft-com:mac:vml" xmlns:c="http://schemas.openxmlformats.org/drawingml/2006/chart" xmlns:dgm="http://schemas.openxmlformats.org/drawingml/2006/diagram" xmlns:o="urn:schemas-microsoft-com:office:office" xmlns:v="urn:schemas-microsoft-com:vml" xmlns:pvml="urn:schemas-microsoft-com:office:powerpoint" xmlns:com="http://schemas.openxmlformats.org/drawingml/2006/compatibility" xmlns:p15="http://schemas.microsoft.com/office/powerpoint/2012/main" xmlns:ahyp="http://schemas.microsoft.com/office/drawing/2018/hyperlinkcolor">
+    <mc:Fallback xmlns:ahyp="http://schemas.microsoft.com/office/drawing/2018/hyperlinkcolor" xmlns:p15="http://schemas.microsoft.com/office/powerpoint/2012/main" xmlns:com="http://schemas.openxmlformats.org/drawingml/2006/compatibility" xmlns:pvml="urn:schemas-microsoft-com:office:powerpoint" xmlns:v="urn:schemas-microsoft-com:vml" xmlns:o="urn:schemas-microsoft-com:office:office" xmlns:dgm="http://schemas.openxmlformats.org/drawingml/2006/diagram" xmlns:c="http://schemas.openxmlformats.org/drawingml/2006/chart" xmlns:mv="urn:schemas-microsoft-com:mac:vml" xmlns="">
       <p:transition spd="slow">
         <p:fade/>
       </p:transition>
@@ -13202,7 +13241,7 @@
         <p:fade/>
       </p:transition>
     </mc:Choice>
-    <mc:Fallback xmlns="" xmlns:mv="urn:schemas-microsoft-com:mac:vml" xmlns:c="http://schemas.openxmlformats.org/drawingml/2006/chart" xmlns:dgm="http://schemas.openxmlformats.org/drawingml/2006/diagram" xmlns:o="urn:schemas-microsoft-com:office:office" xmlns:v="urn:schemas-microsoft-com:vml" xmlns:pvml="urn:schemas-microsoft-com:office:powerpoint" xmlns:com="http://schemas.openxmlformats.org/drawingml/2006/compatibility" xmlns:p15="http://schemas.microsoft.com/office/powerpoint/2012/main" xmlns:ahyp="http://schemas.microsoft.com/office/drawing/2018/hyperlinkcolor">
+    <mc:Fallback xmlns:ahyp="http://schemas.microsoft.com/office/drawing/2018/hyperlinkcolor" xmlns:p15="http://schemas.microsoft.com/office/powerpoint/2012/main" xmlns:com="http://schemas.openxmlformats.org/drawingml/2006/compatibility" xmlns:pvml="urn:schemas-microsoft-com:office:powerpoint" xmlns:v="urn:schemas-microsoft-com:vml" xmlns:o="urn:schemas-microsoft-com:office:office" xmlns:dgm="http://schemas.openxmlformats.org/drawingml/2006/diagram" xmlns:c="http://schemas.openxmlformats.org/drawingml/2006/chart" xmlns:mv="urn:schemas-microsoft-com:mac:vml" xmlns="">
       <p:transition spd="slow">
         <p:fade/>
       </p:transition>
@@ -14003,7 +14042,7 @@
         <p:fade/>
       </p:transition>
     </mc:Choice>
-    <mc:Fallback xmlns="" xmlns:mv="urn:schemas-microsoft-com:mac:vml" xmlns:c="http://schemas.openxmlformats.org/drawingml/2006/chart" xmlns:dgm="http://schemas.openxmlformats.org/drawingml/2006/diagram" xmlns:o="urn:schemas-microsoft-com:office:office" xmlns:v="urn:schemas-microsoft-com:vml" xmlns:pvml="urn:schemas-microsoft-com:office:powerpoint" xmlns:com="http://schemas.openxmlformats.org/drawingml/2006/compatibility" xmlns:p15="http://schemas.microsoft.com/office/powerpoint/2012/main" xmlns:ahyp="http://schemas.microsoft.com/office/drawing/2018/hyperlinkcolor">
+    <mc:Fallback xmlns:ahyp="http://schemas.microsoft.com/office/drawing/2018/hyperlinkcolor" xmlns:p15="http://schemas.microsoft.com/office/powerpoint/2012/main" xmlns:com="http://schemas.openxmlformats.org/drawingml/2006/compatibility" xmlns:pvml="urn:schemas-microsoft-com:office:powerpoint" xmlns:v="urn:schemas-microsoft-com:vml" xmlns:o="urn:schemas-microsoft-com:office:office" xmlns:dgm="http://schemas.openxmlformats.org/drawingml/2006/diagram" xmlns:c="http://schemas.openxmlformats.org/drawingml/2006/chart" xmlns:mv="urn:schemas-microsoft-com:mac:vml" xmlns="">
       <p:transition spd="slow">
         <p:fade/>
       </p:transition>
@@ -15179,7 +15218,7 @@
         <p:fade/>
       </p:transition>
     </mc:Choice>
-    <mc:Fallback xmlns="" xmlns:mv="urn:schemas-microsoft-com:mac:vml" xmlns:c="http://schemas.openxmlformats.org/drawingml/2006/chart" xmlns:dgm="http://schemas.openxmlformats.org/drawingml/2006/diagram" xmlns:o="urn:schemas-microsoft-com:office:office" xmlns:v="urn:schemas-microsoft-com:vml" xmlns:pvml="urn:schemas-microsoft-com:office:powerpoint" xmlns:com="http://schemas.openxmlformats.org/drawingml/2006/compatibility" xmlns:p15="http://schemas.microsoft.com/office/powerpoint/2012/main" xmlns:ahyp="http://schemas.microsoft.com/office/drawing/2018/hyperlinkcolor">
+    <mc:Fallback xmlns:ahyp="http://schemas.microsoft.com/office/drawing/2018/hyperlinkcolor" xmlns:p15="http://schemas.microsoft.com/office/powerpoint/2012/main" xmlns:com="http://schemas.openxmlformats.org/drawingml/2006/compatibility" xmlns:pvml="urn:schemas-microsoft-com:office:powerpoint" xmlns:v="urn:schemas-microsoft-com:vml" xmlns:o="urn:schemas-microsoft-com:office:office" xmlns:dgm="http://schemas.openxmlformats.org/drawingml/2006/diagram" xmlns:c="http://schemas.openxmlformats.org/drawingml/2006/chart" xmlns:mv="urn:schemas-microsoft-com:mac:vml" xmlns="">
       <p:transition spd="slow">
         <p:fade/>
       </p:transition>
@@ -17168,7 +17207,7 @@
         <p:fade/>
       </p:transition>
     </mc:Choice>
-    <mc:Fallback xmlns="" xmlns:mv="urn:schemas-microsoft-com:mac:vml" xmlns:c="http://schemas.openxmlformats.org/drawingml/2006/chart" xmlns:dgm="http://schemas.openxmlformats.org/drawingml/2006/diagram" xmlns:o="urn:schemas-microsoft-com:office:office" xmlns:v="urn:schemas-microsoft-com:vml" xmlns:pvml="urn:schemas-microsoft-com:office:powerpoint" xmlns:com="http://schemas.openxmlformats.org/drawingml/2006/compatibility" xmlns:p15="http://schemas.microsoft.com/office/powerpoint/2012/main" xmlns:ahyp="http://schemas.microsoft.com/office/drawing/2018/hyperlinkcolor">
+    <mc:Fallback xmlns:ahyp="http://schemas.microsoft.com/office/drawing/2018/hyperlinkcolor" xmlns:p15="http://schemas.microsoft.com/office/powerpoint/2012/main" xmlns:com="http://schemas.openxmlformats.org/drawingml/2006/compatibility" xmlns:pvml="urn:schemas-microsoft-com:office:powerpoint" xmlns:v="urn:schemas-microsoft-com:vml" xmlns:o="urn:schemas-microsoft-com:office:office" xmlns:dgm="http://schemas.openxmlformats.org/drawingml/2006/diagram" xmlns:c="http://schemas.openxmlformats.org/drawingml/2006/chart" xmlns:mv="urn:schemas-microsoft-com:mac:vml" xmlns="">
       <p:transition spd="slow">
         <p:fade/>
       </p:transition>
@@ -18156,7 +18195,7 @@
         <p:fade/>
       </p:transition>
     </mc:Choice>
-    <mc:Fallback xmlns="" xmlns:mv="urn:schemas-microsoft-com:mac:vml" xmlns:c="http://schemas.openxmlformats.org/drawingml/2006/chart" xmlns:dgm="http://schemas.openxmlformats.org/drawingml/2006/diagram" xmlns:o="urn:schemas-microsoft-com:office:office" xmlns:v="urn:schemas-microsoft-com:vml" xmlns:pvml="urn:schemas-microsoft-com:office:powerpoint" xmlns:com="http://schemas.openxmlformats.org/drawingml/2006/compatibility" xmlns:p15="http://schemas.microsoft.com/office/powerpoint/2012/main" xmlns:ahyp="http://schemas.microsoft.com/office/drawing/2018/hyperlinkcolor">
+    <mc:Fallback xmlns:ahyp="http://schemas.microsoft.com/office/drawing/2018/hyperlinkcolor" xmlns:p15="http://schemas.microsoft.com/office/powerpoint/2012/main" xmlns:com="http://schemas.openxmlformats.org/drawingml/2006/compatibility" xmlns:pvml="urn:schemas-microsoft-com:office:powerpoint" xmlns:v="urn:schemas-microsoft-com:vml" xmlns:o="urn:schemas-microsoft-com:office:office" xmlns:dgm="http://schemas.openxmlformats.org/drawingml/2006/diagram" xmlns:c="http://schemas.openxmlformats.org/drawingml/2006/chart" xmlns:mv="urn:schemas-microsoft-com:mac:vml" xmlns="">
       <p:transition spd="slow">
         <p:fade/>
       </p:transition>
@@ -19144,7 +19183,7 @@
         <p:fade/>
       </p:transition>
     </mc:Choice>
-    <mc:Fallback xmlns="" xmlns:mv="urn:schemas-microsoft-com:mac:vml" xmlns:c="http://schemas.openxmlformats.org/drawingml/2006/chart" xmlns:dgm="http://schemas.openxmlformats.org/drawingml/2006/diagram" xmlns:o="urn:schemas-microsoft-com:office:office" xmlns:v="urn:schemas-microsoft-com:vml" xmlns:pvml="urn:schemas-microsoft-com:office:powerpoint" xmlns:com="http://schemas.openxmlformats.org/drawingml/2006/compatibility" xmlns:p15="http://schemas.microsoft.com/office/powerpoint/2012/main" xmlns:ahyp="http://schemas.microsoft.com/office/drawing/2018/hyperlinkcolor">
+    <mc:Fallback xmlns:ahyp="http://schemas.microsoft.com/office/drawing/2018/hyperlinkcolor" xmlns:p15="http://schemas.microsoft.com/office/powerpoint/2012/main" xmlns:com="http://schemas.openxmlformats.org/drawingml/2006/compatibility" xmlns:pvml="urn:schemas-microsoft-com:office:powerpoint" xmlns:v="urn:schemas-microsoft-com:vml" xmlns:o="urn:schemas-microsoft-com:office:office" xmlns:dgm="http://schemas.openxmlformats.org/drawingml/2006/diagram" xmlns:c="http://schemas.openxmlformats.org/drawingml/2006/chart" xmlns:mv="urn:schemas-microsoft-com:mac:vml" xmlns="">
       <p:transition spd="slow">
         <p:fade/>
       </p:transition>
@@ -29877,7 +29916,7 @@
         <p:fade/>
       </p:transition>
     </mc:Choice>
-    <mc:Fallback xmlns="" xmlns:mv="urn:schemas-microsoft-com:mac:vml" xmlns:c="http://schemas.openxmlformats.org/drawingml/2006/chart" xmlns:dgm="http://schemas.openxmlformats.org/drawingml/2006/diagram" xmlns:o="urn:schemas-microsoft-com:office:office" xmlns:v="urn:schemas-microsoft-com:vml" xmlns:pvml="urn:schemas-microsoft-com:office:powerpoint" xmlns:com="http://schemas.openxmlformats.org/drawingml/2006/compatibility" xmlns:p15="http://schemas.microsoft.com/office/powerpoint/2012/main" xmlns:ahyp="http://schemas.microsoft.com/office/drawing/2018/hyperlinkcolor">
+    <mc:Fallback xmlns:ahyp="http://schemas.microsoft.com/office/drawing/2018/hyperlinkcolor" xmlns:p15="http://schemas.microsoft.com/office/powerpoint/2012/main" xmlns:com="http://schemas.openxmlformats.org/drawingml/2006/compatibility" xmlns:pvml="urn:schemas-microsoft-com:office:powerpoint" xmlns:v="urn:schemas-microsoft-com:vml" xmlns:o="urn:schemas-microsoft-com:office:office" xmlns:dgm="http://schemas.openxmlformats.org/drawingml/2006/diagram" xmlns:c="http://schemas.openxmlformats.org/drawingml/2006/chart" xmlns:mv="urn:schemas-microsoft-com:mac:vml" xmlns="">
       <p:transition spd="slow">
         <p:fade/>
       </p:transition>
@@ -31302,7 +31341,7 @@
         <p:fade/>
       </p:transition>
     </mc:Choice>
-    <mc:Fallback xmlns="" xmlns:mv="urn:schemas-microsoft-com:mac:vml" xmlns:c="http://schemas.openxmlformats.org/drawingml/2006/chart" xmlns:dgm="http://schemas.openxmlformats.org/drawingml/2006/diagram" xmlns:o="urn:schemas-microsoft-com:office:office" xmlns:v="urn:schemas-microsoft-com:vml" xmlns:pvml="urn:schemas-microsoft-com:office:powerpoint" xmlns:com="http://schemas.openxmlformats.org/drawingml/2006/compatibility" xmlns:p15="http://schemas.microsoft.com/office/powerpoint/2012/main" xmlns:ahyp="http://schemas.microsoft.com/office/drawing/2018/hyperlinkcolor">
+    <mc:Fallback xmlns:ahyp="http://schemas.microsoft.com/office/drawing/2018/hyperlinkcolor" xmlns:p15="http://schemas.microsoft.com/office/powerpoint/2012/main" xmlns:com="http://schemas.openxmlformats.org/drawingml/2006/compatibility" xmlns:pvml="urn:schemas-microsoft-com:office:powerpoint" xmlns:v="urn:schemas-microsoft-com:vml" xmlns:o="urn:schemas-microsoft-com:office:office" xmlns:dgm="http://schemas.openxmlformats.org/drawingml/2006/diagram" xmlns:c="http://schemas.openxmlformats.org/drawingml/2006/chart" xmlns:mv="urn:schemas-microsoft-com:mac:vml" xmlns="">
       <p:transition spd="slow">
         <p:fade/>
       </p:transition>
@@ -31401,7 +31440,7 @@
           <p:nvPr>
             <p:extLst>
               <p:ext uri="{D42A27DB-BD31-4B8C-83A1-F6EECF244321}">
-                <p14:modId xmlns:p14="http://schemas.microsoft.com/office/powerpoint/2010/main" val="3138376155"/>
+                <p14:modId xmlns:p14="http://schemas.microsoft.com/office/powerpoint/2010/main" val="1630481181"/>
               </p:ext>
             </p:extLst>
           </p:nvPr>
@@ -32730,6 +32769,7 @@
                         <a:buFontTx/>
                         <a:buNone/>
                         <a:tabLst/>
+                        <a:defRPr/>
                       </a:pPr>
                       <a:r>
                         <a:rPr kumimoji="0" lang="en-US" altLang="id-ID" sz="1800" b="0" i="0" u="none" strike="noStrike" cap="none" normalizeH="0" baseline="0">
@@ -32740,23 +32780,25 @@
                             <a:schemeClr val="tx1"/>
                           </a:solidFill>
                           <a:effectLst/>
-                          <a:latin typeface="+mn-lt"/>
+                          <a:latin typeface="Arial"/>
                           <a:ea typeface="Tahoma" panose="020B0604030504040204" pitchFamily="34" charset="0"/>
                           <a:cs typeface="Times New Roman" panose="02020603050405020304" pitchFamily="18" charset="0"/>
+                          <a:sym typeface="Arial"/>
                         </a:rPr>
-                        <a:t>Introduction to Clustering Analysis</a:t>
+                        <a:t>Association Rules</a:t>
                       </a:r>
-                      <a:endParaRPr kumimoji="0" lang="en-US" altLang="id-ID" sz="1800" b="0" i="0" u="none" strike="noStrike" cap="none" normalizeH="0" baseline="0" dirty="0">
+                      <a:endParaRPr kumimoji="0" lang="en-US" altLang="id-ID" sz="1800" b="0" i="0" u="none" strike="noStrike" cap="none" normalizeH="0" baseline="0">
                         <a:ln>
                           <a:noFill/>
                         </a:ln>
                         <a:solidFill>
-                          <a:schemeClr val="tx1"/>
+                          <a:srgbClr val="0000CC"/>
                         </a:solidFill>
                         <a:effectLst/>
-                        <a:latin typeface="+mn-lt"/>
+                        <a:latin typeface="Arial"/>
                         <a:ea typeface="Tahoma" panose="020B0604030504040204" pitchFamily="34" charset="0"/>
                         <a:cs typeface="Times New Roman" panose="02020603050405020304" pitchFamily="18" charset="0"/>
+                        <a:sym typeface="Arial"/>
                       </a:endParaRPr>
                     </a:p>
                   </a:txBody>
@@ -32966,6 +33008,7 @@
                         <a:buFontTx/>
                         <a:buNone/>
                         <a:tabLst/>
+                        <a:defRPr/>
                       </a:pPr>
                       <a:r>
                         <a:rPr kumimoji="0" lang="en-US" altLang="id-ID" sz="1800" b="0" i="0" u="none" strike="noStrike" cap="none" normalizeH="0" baseline="0">
@@ -32976,24 +33019,13 @@
                             <a:schemeClr val="tx1"/>
                           </a:solidFill>
                           <a:effectLst/>
-                          <a:latin typeface="+mn-lt"/>
+                          <a:latin typeface="Arial"/>
                           <a:ea typeface="Tahoma" panose="020B0604030504040204" pitchFamily="34" charset="0"/>
                           <a:cs typeface="Times New Roman" panose="02020603050405020304" pitchFamily="18" charset="0"/>
+                          <a:sym typeface="Arial"/>
                         </a:rPr>
-                        <a:t>Association Rules</a:t>
+                        <a:t>Introduction to Clustering Analysis</a:t>
                       </a:r>
-                      <a:endParaRPr kumimoji="0" lang="en-US" altLang="id-ID" sz="1800" b="0" i="0" u="none" strike="noStrike" cap="none" normalizeH="0" baseline="0" dirty="0">
-                        <a:ln>
-                          <a:noFill/>
-                        </a:ln>
-                        <a:solidFill>
-                          <a:srgbClr val="0000CC"/>
-                        </a:solidFill>
-                        <a:effectLst/>
-                        <a:latin typeface="+mn-lt"/>
-                        <a:ea typeface="Tahoma" panose="020B0604030504040204" pitchFamily="34" charset="0"/>
-                        <a:cs typeface="Times New Roman" panose="02020603050405020304" pitchFamily="18" charset="0"/>
-                      </a:endParaRPr>
                     </a:p>
                   </a:txBody>
                   <a:tcPr marL="68588" marR="68588" marT="34294" marB="34294">
@@ -33219,7 +33251,23 @@
                           <a:ea typeface="Tahoma" panose="020B0604030504040204" pitchFamily="34" charset="0"/>
                           <a:cs typeface="Times New Roman" panose="02020603050405020304" pitchFamily="18" charset="0"/>
                         </a:rPr>
-                        <a:t>Case Study - 02: Clustering Analysis &amp; Association Rule</a:t>
+                        <a:t>Case Study - 02: Association Rule &amp; </a:t>
+                      </a:r>
+                      <a:r>
+                        <a:rPr kumimoji="0" lang="en-US" altLang="id-ID" sz="1800" b="1" i="0" u="none" strike="noStrike" cap="none" normalizeH="0" baseline="0">
+                          <a:ln>
+                            <a:noFill/>
+                          </a:ln>
+                          <a:solidFill>
+                            <a:schemeClr val="tx1"/>
+                          </a:solidFill>
+                          <a:effectLst/>
+                          <a:latin typeface="Arial"/>
+                          <a:ea typeface="Tahoma" panose="020B0604030504040204" pitchFamily="34" charset="0"/>
+                          <a:cs typeface="Times New Roman" panose="02020603050405020304" pitchFamily="18" charset="0"/>
+                          <a:sym typeface="Arial"/>
+                        </a:rPr>
+                        <a:t>Clustering Analysis </a:t>
                       </a:r>
                       <a:endParaRPr kumimoji="0" lang="en-US" altLang="id-ID" sz="1800" b="1" i="0" u="none" strike="noStrike" cap="none" normalizeH="0" baseline="0" dirty="0">
                         <a:ln>
@@ -33528,7 +33576,7 @@
         <p:fade/>
       </p:transition>
     </mc:Choice>
-    <mc:Fallback xmlns="" xmlns:mv="urn:schemas-microsoft-com:mac:vml" xmlns:c="http://schemas.openxmlformats.org/drawingml/2006/chart" xmlns:dgm="http://schemas.openxmlformats.org/drawingml/2006/diagram" xmlns:o="urn:schemas-microsoft-com:office:office" xmlns:v="urn:schemas-microsoft-com:vml" xmlns:pvml="urn:schemas-microsoft-com:office:powerpoint" xmlns:com="http://schemas.openxmlformats.org/drawingml/2006/compatibility" xmlns:p15="http://schemas.microsoft.com/office/powerpoint/2012/main" xmlns:ahyp="http://schemas.microsoft.com/office/drawing/2018/hyperlinkcolor">
+    <mc:Fallback xmlns:ahyp="http://schemas.microsoft.com/office/drawing/2018/hyperlinkcolor" xmlns:p15="http://schemas.microsoft.com/office/powerpoint/2012/main" xmlns:com="http://schemas.openxmlformats.org/drawingml/2006/compatibility" xmlns:pvml="urn:schemas-microsoft-com:office:powerpoint" xmlns:v="urn:schemas-microsoft-com:vml" xmlns:o="urn:schemas-microsoft-com:office:office" xmlns:dgm="http://schemas.openxmlformats.org/drawingml/2006/diagram" xmlns:c="http://schemas.openxmlformats.org/drawingml/2006/chart" xmlns:mv="urn:schemas-microsoft-com:mac:vml" xmlns="">
       <p:transition spd="slow">
         <p:fade/>
       </p:transition>
@@ -33627,7 +33675,7 @@
           <p:nvPr>
             <p:extLst>
               <p:ext uri="{D42A27DB-BD31-4B8C-83A1-F6EECF244321}">
-                <p14:modId xmlns:p14="http://schemas.microsoft.com/office/powerpoint/2010/main" val="4087513175"/>
+                <p14:modId xmlns:p14="http://schemas.microsoft.com/office/powerpoint/2010/main" val="3233997443"/>
               </p:ext>
             </p:extLst>
           </p:nvPr>
@@ -34013,6 +34061,20 @@
                         <a:tabLst/>
                       </a:pPr>
                       <a:r>
+                        <a:rPr kumimoji="0" lang="en-US" altLang="id-ID" sz="1800" b="1" i="0" u="none" strike="noStrike" cap="none" normalizeH="0" baseline="0">
+                          <a:ln>
+                            <a:noFill/>
+                          </a:ln>
+                          <a:solidFill>
+                            <a:schemeClr val="tx1"/>
+                          </a:solidFill>
+                          <a:effectLst/>
+                          <a:latin typeface="+mj-lt"/>
+                          <a:cs typeface="Times New Roman" panose="02020603050405020304" pitchFamily="18" charset="0"/>
+                        </a:rPr>
+                        <a:t>Supervised Learning: </a:t>
+                      </a:r>
+                      <a:r>
                         <a:rPr kumimoji="0" lang="en-US" altLang="id-ID" sz="1800" b="0" i="0" u="none" strike="noStrike" cap="none" normalizeH="0" baseline="0">
                           <a:ln>
                             <a:noFill/>
@@ -34242,6 +34304,22 @@
                         <a:buNone/>
                         <a:tabLst/>
                       </a:pPr>
+                      <a:r>
+                        <a:rPr kumimoji="0" lang="en-US" altLang="id-ID" sz="1800" b="1" i="0" u="none" strike="noStrike" cap="none" normalizeH="0" baseline="0">
+                          <a:ln>
+                            <a:noFill/>
+                          </a:ln>
+                          <a:solidFill>
+                            <a:schemeClr val="tx1"/>
+                          </a:solidFill>
+                          <a:effectLst/>
+                          <a:latin typeface="Arial"/>
+                          <a:ea typeface="Arial"/>
+                          <a:cs typeface="Times New Roman" panose="02020603050405020304" pitchFamily="18" charset="0"/>
+                          <a:sym typeface="Arial"/>
+                        </a:rPr>
+                        <a:t>Supervised Learning: </a:t>
+                      </a:r>
                       <a:r>
                         <a:rPr kumimoji="0" lang="en-US" altLang="id-ID" sz="1800" b="0" i="0" u="none" strike="noStrike" cap="none" normalizeH="0" baseline="0">
                           <a:ln>
@@ -34474,6 +34552,22 @@
                         <a:buNone/>
                         <a:tabLst/>
                       </a:pPr>
+                      <a:r>
+                        <a:rPr kumimoji="0" lang="en-US" altLang="id-ID" sz="1800" b="1" i="0" u="none" strike="noStrike" cap="none" normalizeH="0" baseline="0">
+                          <a:ln>
+                            <a:noFill/>
+                          </a:ln>
+                          <a:solidFill>
+                            <a:schemeClr val="tx1"/>
+                          </a:solidFill>
+                          <a:effectLst/>
+                          <a:latin typeface="Arial"/>
+                          <a:ea typeface="Arial"/>
+                          <a:cs typeface="Times New Roman" panose="02020603050405020304" pitchFamily="18" charset="0"/>
+                          <a:sym typeface="Arial"/>
+                        </a:rPr>
+                        <a:t>Supervised Learning: </a:t>
+                      </a:r>
                       <a:r>
                         <a:rPr kumimoji="0" lang="en-US" altLang="id-ID" sz="1800" b="0" i="0" u="none" strike="noStrike" cap="none" normalizeH="0" baseline="0">
                           <a:ln>
@@ -35689,7 +35783,7 @@
         <p:fade/>
       </p:transition>
     </mc:Choice>
-    <mc:Fallback xmlns="" xmlns:mv="urn:schemas-microsoft-com:mac:vml" xmlns:c="http://schemas.openxmlformats.org/drawingml/2006/chart" xmlns:dgm="http://schemas.openxmlformats.org/drawingml/2006/diagram" xmlns:o="urn:schemas-microsoft-com:office:office" xmlns:v="urn:schemas-microsoft-com:vml" xmlns:pvml="urn:schemas-microsoft-com:office:powerpoint" xmlns:com="http://schemas.openxmlformats.org/drawingml/2006/compatibility" xmlns:p15="http://schemas.microsoft.com/office/powerpoint/2012/main" xmlns:ahyp="http://schemas.microsoft.com/office/drawing/2018/hyperlinkcolor">
+    <mc:Fallback xmlns:ahyp="http://schemas.microsoft.com/office/drawing/2018/hyperlinkcolor" xmlns:p15="http://schemas.microsoft.com/office/powerpoint/2012/main" xmlns:com="http://schemas.openxmlformats.org/drawingml/2006/compatibility" xmlns:pvml="urn:schemas-microsoft-com:office:powerpoint" xmlns:v="urn:schemas-microsoft-com:vml" xmlns:o="urn:schemas-microsoft-com:office:office" xmlns:dgm="http://schemas.openxmlformats.org/drawingml/2006/diagram" xmlns:c="http://schemas.openxmlformats.org/drawingml/2006/chart" xmlns:mv="urn:schemas-microsoft-com:mac:vml" xmlns="">
       <p:transition spd="slow">
         <p:fade/>
       </p:transition>
@@ -37242,7 +37336,7 @@
         <p:fade/>
       </p:transition>
     </mc:Choice>
-    <mc:Fallback xmlns="" xmlns:mv="urn:schemas-microsoft-com:mac:vml" xmlns:c="http://schemas.openxmlformats.org/drawingml/2006/chart" xmlns:dgm="http://schemas.openxmlformats.org/drawingml/2006/diagram" xmlns:o="urn:schemas-microsoft-com:office:office" xmlns:v="urn:schemas-microsoft-com:vml" xmlns:pvml="urn:schemas-microsoft-com:office:powerpoint" xmlns:com="http://schemas.openxmlformats.org/drawingml/2006/compatibility" xmlns:p15="http://schemas.microsoft.com/office/powerpoint/2012/main" xmlns:ahyp="http://schemas.microsoft.com/office/drawing/2018/hyperlinkcolor">
+    <mc:Fallback xmlns:ahyp="http://schemas.microsoft.com/office/drawing/2018/hyperlinkcolor" xmlns:p15="http://schemas.microsoft.com/office/powerpoint/2012/main" xmlns:com="http://schemas.openxmlformats.org/drawingml/2006/compatibility" xmlns:pvml="urn:schemas-microsoft-com:office:powerpoint" xmlns:v="urn:schemas-microsoft-com:vml" xmlns:o="urn:schemas-microsoft-com:office:office" xmlns:dgm="http://schemas.openxmlformats.org/drawingml/2006/diagram" xmlns:c="http://schemas.openxmlformats.org/drawingml/2006/chart" xmlns:mv="urn:schemas-microsoft-com:mac:vml" xmlns="">
       <p:transition spd="slow">
         <p:fade/>
       </p:transition>
@@ -37535,7 +37629,7 @@
         <p:fade/>
       </p:transition>
     </mc:Choice>
-    <mc:Fallback xmlns="" xmlns:mv="urn:schemas-microsoft-com:mac:vml" xmlns:c="http://schemas.openxmlformats.org/drawingml/2006/chart" xmlns:dgm="http://schemas.openxmlformats.org/drawingml/2006/diagram" xmlns:o="urn:schemas-microsoft-com:office:office" xmlns:v="urn:schemas-microsoft-com:vml" xmlns:pvml="urn:schemas-microsoft-com:office:powerpoint" xmlns:com="http://schemas.openxmlformats.org/drawingml/2006/compatibility" xmlns:p15="http://schemas.microsoft.com/office/powerpoint/2012/main" xmlns:ahyp="http://schemas.microsoft.com/office/drawing/2018/hyperlinkcolor">
+    <mc:Fallback xmlns:ahyp="http://schemas.microsoft.com/office/drawing/2018/hyperlinkcolor" xmlns:p15="http://schemas.microsoft.com/office/powerpoint/2012/main" xmlns:com="http://schemas.openxmlformats.org/drawingml/2006/compatibility" xmlns:pvml="urn:schemas-microsoft-com:office:powerpoint" xmlns:v="urn:schemas-microsoft-com:vml" xmlns:o="urn:schemas-microsoft-com:office:office" xmlns:dgm="http://schemas.openxmlformats.org/drawingml/2006/diagram" xmlns:c="http://schemas.openxmlformats.org/drawingml/2006/chart" xmlns:mv="urn:schemas-microsoft-com:mac:vml" xmlns="">
       <p:transition spd="slow">
         <p:fade/>
       </p:transition>
@@ -38690,7 +38784,7 @@
         <p:fade/>
       </p:transition>
     </mc:Choice>
-    <mc:Fallback xmlns="" xmlns:mv="urn:schemas-microsoft-com:mac:vml" xmlns:c="http://schemas.openxmlformats.org/drawingml/2006/chart" xmlns:dgm="http://schemas.openxmlformats.org/drawingml/2006/diagram" xmlns:o="urn:schemas-microsoft-com:office:office" xmlns:v="urn:schemas-microsoft-com:vml" xmlns:pvml="urn:schemas-microsoft-com:office:powerpoint" xmlns:com="http://schemas.openxmlformats.org/drawingml/2006/compatibility" xmlns:p15="http://schemas.microsoft.com/office/powerpoint/2012/main" xmlns:ahyp="http://schemas.microsoft.com/office/drawing/2018/hyperlinkcolor">
+    <mc:Fallback xmlns:ahyp="http://schemas.microsoft.com/office/drawing/2018/hyperlinkcolor" xmlns:p15="http://schemas.microsoft.com/office/powerpoint/2012/main" xmlns:com="http://schemas.openxmlformats.org/drawingml/2006/compatibility" xmlns:pvml="urn:schemas-microsoft-com:office:powerpoint" xmlns:v="urn:schemas-microsoft-com:vml" xmlns:o="urn:schemas-microsoft-com:office:office" xmlns:dgm="http://schemas.openxmlformats.org/drawingml/2006/diagram" xmlns:c="http://schemas.openxmlformats.org/drawingml/2006/chart" xmlns:mv="urn:schemas-microsoft-com:mac:vml" xmlns="">
       <p:transition spd="slow">
         <p:fade/>
       </p:transition>
@@ -39376,7 +39470,7 @@
         <p:fade/>
       </p:transition>
     </mc:Choice>
-    <mc:Fallback xmlns="" xmlns:mv="urn:schemas-microsoft-com:mac:vml" xmlns:c="http://schemas.openxmlformats.org/drawingml/2006/chart" xmlns:dgm="http://schemas.openxmlformats.org/drawingml/2006/diagram" xmlns:o="urn:schemas-microsoft-com:office:office" xmlns:v="urn:schemas-microsoft-com:vml" xmlns:pvml="urn:schemas-microsoft-com:office:powerpoint" xmlns:com="http://schemas.openxmlformats.org/drawingml/2006/compatibility" xmlns:p15="http://schemas.microsoft.com/office/powerpoint/2012/main" xmlns:ahyp="http://schemas.microsoft.com/office/drawing/2018/hyperlinkcolor">
+    <mc:Fallback xmlns:ahyp="http://schemas.microsoft.com/office/drawing/2018/hyperlinkcolor" xmlns:p15="http://schemas.microsoft.com/office/powerpoint/2012/main" xmlns:com="http://schemas.openxmlformats.org/drawingml/2006/compatibility" xmlns:pvml="urn:schemas-microsoft-com:office:powerpoint" xmlns:v="urn:schemas-microsoft-com:vml" xmlns:o="urn:schemas-microsoft-com:office:office" xmlns:dgm="http://schemas.openxmlformats.org/drawingml/2006/diagram" xmlns:c="http://schemas.openxmlformats.org/drawingml/2006/chart" xmlns:mv="urn:schemas-microsoft-com:mac:vml" xmlns="">
       <p:transition spd="slow">
         <p:fade/>
       </p:transition>
@@ -40348,7 +40442,7 @@
         <p:fade/>
       </p:transition>
     </mc:Choice>
-    <mc:Fallback xmlns="" xmlns:mv="urn:schemas-microsoft-com:mac:vml" xmlns:c="http://schemas.openxmlformats.org/drawingml/2006/chart" xmlns:dgm="http://schemas.openxmlformats.org/drawingml/2006/diagram" xmlns:o="urn:schemas-microsoft-com:office:office" xmlns:v="urn:schemas-microsoft-com:vml" xmlns:pvml="urn:schemas-microsoft-com:office:powerpoint" xmlns:com="http://schemas.openxmlformats.org/drawingml/2006/compatibility" xmlns:p15="http://schemas.microsoft.com/office/powerpoint/2012/main" xmlns:ahyp="http://schemas.microsoft.com/office/drawing/2018/hyperlinkcolor">
+    <mc:Fallback xmlns:ahyp="http://schemas.microsoft.com/office/drawing/2018/hyperlinkcolor" xmlns:p15="http://schemas.microsoft.com/office/powerpoint/2012/main" xmlns:com="http://schemas.openxmlformats.org/drawingml/2006/compatibility" xmlns:pvml="urn:schemas-microsoft-com:office:powerpoint" xmlns:v="urn:schemas-microsoft-com:vml" xmlns:o="urn:schemas-microsoft-com:office:office" xmlns:dgm="http://schemas.openxmlformats.org/drawingml/2006/diagram" xmlns:c="http://schemas.openxmlformats.org/drawingml/2006/chart" xmlns:mv="urn:schemas-microsoft-com:mac:vml" xmlns="">
       <p:transition spd="slow">
         <p:fade/>
       </p:transition>
@@ -47950,7 +48044,7 @@
         <p:fade/>
       </p:transition>
     </mc:Choice>
-    <mc:Fallback xmlns:ahyp="http://schemas.microsoft.com/office/drawing/2018/hyperlinkcolor" xmlns:p15="http://schemas.microsoft.com/office/powerpoint/2012/main" xmlns:com="http://schemas.openxmlformats.org/drawingml/2006/compatibility" xmlns:pvml="urn:schemas-microsoft-com:office:powerpoint" xmlns:v="urn:schemas-microsoft-com:vml" xmlns:o="urn:schemas-microsoft-com:office:office" xmlns:dgm="http://schemas.openxmlformats.org/drawingml/2006/diagram" xmlns:c="http://schemas.openxmlformats.org/drawingml/2006/chart" xmlns:mv="urn:schemas-microsoft-com:mac:vml" xmlns="">
+    <mc:Fallback xmlns="" xmlns:mv="urn:schemas-microsoft-com:mac:vml" xmlns:c="http://schemas.openxmlformats.org/drawingml/2006/chart" xmlns:dgm="http://schemas.openxmlformats.org/drawingml/2006/diagram" xmlns:o="urn:schemas-microsoft-com:office:office" xmlns:v="urn:schemas-microsoft-com:vml" xmlns:pvml="urn:schemas-microsoft-com:office:powerpoint" xmlns:com="http://schemas.openxmlformats.org/drawingml/2006/compatibility" xmlns:p15="http://schemas.microsoft.com/office/powerpoint/2012/main" xmlns:ahyp="http://schemas.microsoft.com/office/drawing/2018/hyperlinkcolor">
       <p:transition spd="slow">
         <p:fade/>
       </p:transition>
@@ -48115,7 +48209,7 @@
         <p:fade/>
       </p:transition>
     </mc:Choice>
-    <mc:Fallback xmlns="" xmlns:mv="urn:schemas-microsoft-com:mac:vml" xmlns:c="http://schemas.openxmlformats.org/drawingml/2006/chart" xmlns:dgm="http://schemas.openxmlformats.org/drawingml/2006/diagram" xmlns:o="urn:schemas-microsoft-com:office:office" xmlns:v="urn:schemas-microsoft-com:vml" xmlns:pvml="urn:schemas-microsoft-com:office:powerpoint" xmlns:com="http://schemas.openxmlformats.org/drawingml/2006/compatibility" xmlns:p15="http://schemas.microsoft.com/office/powerpoint/2012/main" xmlns:ahyp="http://schemas.microsoft.com/office/drawing/2018/hyperlinkcolor">
+    <mc:Fallback xmlns:ahyp="http://schemas.microsoft.com/office/drawing/2018/hyperlinkcolor" xmlns:p15="http://schemas.microsoft.com/office/powerpoint/2012/main" xmlns:com="http://schemas.openxmlformats.org/drawingml/2006/compatibility" xmlns:pvml="urn:schemas-microsoft-com:office:powerpoint" xmlns:v="urn:schemas-microsoft-com:vml" xmlns:o="urn:schemas-microsoft-com:office:office" xmlns:dgm="http://schemas.openxmlformats.org/drawingml/2006/diagram" xmlns:c="http://schemas.openxmlformats.org/drawingml/2006/chart" xmlns:mv="urn:schemas-microsoft-com:mac:vml" xmlns="">
       <p:transition spd="slow">
         <p:fade/>
       </p:transition>
@@ -48479,7 +48573,7 @@
         <p:fade/>
       </p:transition>
     </mc:Choice>
-    <mc:Fallback xmlns="" xmlns:mv="urn:schemas-microsoft-com:mac:vml" xmlns:c="http://schemas.openxmlformats.org/drawingml/2006/chart" xmlns:dgm="http://schemas.openxmlformats.org/drawingml/2006/diagram" xmlns:o="urn:schemas-microsoft-com:office:office" xmlns:v="urn:schemas-microsoft-com:vml" xmlns:pvml="urn:schemas-microsoft-com:office:powerpoint" xmlns:com="http://schemas.openxmlformats.org/drawingml/2006/compatibility" xmlns:p15="http://schemas.microsoft.com/office/powerpoint/2012/main" xmlns:ahyp="http://schemas.microsoft.com/office/drawing/2018/hyperlinkcolor">
+    <mc:Fallback xmlns:ahyp="http://schemas.microsoft.com/office/drawing/2018/hyperlinkcolor" xmlns:p15="http://schemas.microsoft.com/office/powerpoint/2012/main" xmlns:com="http://schemas.openxmlformats.org/drawingml/2006/compatibility" xmlns:pvml="urn:schemas-microsoft-com:office:powerpoint" xmlns:v="urn:schemas-microsoft-com:vml" xmlns:o="urn:schemas-microsoft-com:office:office" xmlns:dgm="http://schemas.openxmlformats.org/drawingml/2006/diagram" xmlns:c="http://schemas.openxmlformats.org/drawingml/2006/chart" xmlns:mv="urn:schemas-microsoft-com:mac:vml" xmlns="">
       <p:transition spd="slow">
         <p:fade/>
       </p:transition>
@@ -49806,7 +49900,7 @@
         <p:fade/>
       </p:transition>
     </mc:Choice>
-    <mc:Fallback xmlns="" xmlns:mv="urn:schemas-microsoft-com:mac:vml" xmlns:c="http://schemas.openxmlformats.org/drawingml/2006/chart" xmlns:dgm="http://schemas.openxmlformats.org/drawingml/2006/diagram" xmlns:o="urn:schemas-microsoft-com:office:office" xmlns:v="urn:schemas-microsoft-com:vml" xmlns:pvml="urn:schemas-microsoft-com:office:powerpoint" xmlns:com="http://schemas.openxmlformats.org/drawingml/2006/compatibility" xmlns:p15="http://schemas.microsoft.com/office/powerpoint/2012/main" xmlns:ahyp="http://schemas.microsoft.com/office/drawing/2018/hyperlinkcolor">
+    <mc:Fallback xmlns:ahyp="http://schemas.microsoft.com/office/drawing/2018/hyperlinkcolor" xmlns:p15="http://schemas.microsoft.com/office/powerpoint/2012/main" xmlns:com="http://schemas.openxmlformats.org/drawingml/2006/compatibility" xmlns:pvml="urn:schemas-microsoft-com:office:powerpoint" xmlns:v="urn:schemas-microsoft-com:vml" xmlns:o="urn:schemas-microsoft-com:office:office" xmlns:dgm="http://schemas.openxmlformats.org/drawingml/2006/diagram" xmlns:c="http://schemas.openxmlformats.org/drawingml/2006/chart" xmlns:mv="urn:schemas-microsoft-com:mac:vml" xmlns="">
       <p:transition spd="slow">
         <p:fade/>
       </p:transition>
@@ -50509,7 +50603,7 @@
         <p:fade/>
       </p:transition>
     </mc:Choice>
-    <mc:Fallback xmlns="" xmlns:mv="urn:schemas-microsoft-com:mac:vml" xmlns:c="http://schemas.openxmlformats.org/drawingml/2006/chart" xmlns:dgm="http://schemas.openxmlformats.org/drawingml/2006/diagram" xmlns:o="urn:schemas-microsoft-com:office:office" xmlns:v="urn:schemas-microsoft-com:vml" xmlns:pvml="urn:schemas-microsoft-com:office:powerpoint" xmlns:com="http://schemas.openxmlformats.org/drawingml/2006/compatibility" xmlns:p15="http://schemas.microsoft.com/office/powerpoint/2012/main" xmlns:ahyp="http://schemas.microsoft.com/office/drawing/2018/hyperlinkcolor">
+    <mc:Fallback xmlns:ahyp="http://schemas.microsoft.com/office/drawing/2018/hyperlinkcolor" xmlns:p15="http://schemas.microsoft.com/office/powerpoint/2012/main" xmlns:com="http://schemas.openxmlformats.org/drawingml/2006/compatibility" xmlns:pvml="urn:schemas-microsoft-com:office:powerpoint" xmlns:v="urn:schemas-microsoft-com:vml" xmlns:o="urn:schemas-microsoft-com:office:office" xmlns:dgm="http://schemas.openxmlformats.org/drawingml/2006/diagram" xmlns:c="http://schemas.openxmlformats.org/drawingml/2006/chart" xmlns:mv="urn:schemas-microsoft-com:mac:vml" xmlns="">
       <p:transition spd="slow">
         <p:fade/>
       </p:transition>
@@ -50732,7 +50826,7 @@
         <p:fade/>
       </p:transition>
     </mc:Choice>
-    <mc:Fallback xmlns="" xmlns:mv="urn:schemas-microsoft-com:mac:vml" xmlns:c="http://schemas.openxmlformats.org/drawingml/2006/chart" xmlns:dgm="http://schemas.openxmlformats.org/drawingml/2006/diagram" xmlns:o="urn:schemas-microsoft-com:office:office" xmlns:v="urn:schemas-microsoft-com:vml" xmlns:pvml="urn:schemas-microsoft-com:office:powerpoint" xmlns:com="http://schemas.openxmlformats.org/drawingml/2006/compatibility" xmlns:p15="http://schemas.microsoft.com/office/powerpoint/2012/main" xmlns:ahyp="http://schemas.microsoft.com/office/drawing/2018/hyperlinkcolor">
+    <mc:Fallback xmlns:ahyp="http://schemas.microsoft.com/office/drawing/2018/hyperlinkcolor" xmlns:p15="http://schemas.microsoft.com/office/powerpoint/2012/main" xmlns:com="http://schemas.openxmlformats.org/drawingml/2006/compatibility" xmlns:pvml="urn:schemas-microsoft-com:office:powerpoint" xmlns:v="urn:schemas-microsoft-com:vml" xmlns:o="urn:schemas-microsoft-com:office:office" xmlns:dgm="http://schemas.openxmlformats.org/drawingml/2006/diagram" xmlns:c="http://schemas.openxmlformats.org/drawingml/2006/chart" xmlns:mv="urn:schemas-microsoft-com:mac:vml" xmlns="">
       <p:transition spd="slow">
         <p:fade/>
       </p:transition>

</xml_diff>